<commit_message>
Abstract classes and Interface lecture updated
</commit_message>
<xml_diff>
--- a/slides/On-Campus/11_02_AbstractClassesInterface.pptx
+++ b/slides/On-Campus/11_02_AbstractClassesInterface.pptx
@@ -147,443 +147,30 @@
 <pc:chgInfo xmlns:a="http://schemas.openxmlformats.org/drawingml/2006/main" xmlns:r="http://schemas.openxmlformats.org/officeDocument/2006/relationships" xmlns:ac="http://schemas.microsoft.com/office/drawing/2013/main/command" xmlns:pc="http://schemas.microsoft.com/office/powerpoint/2013/main/command">
   <pc:docChgLst>
     <pc:chgData name="Marcia Moraes" userId="c9c67e8a-58e2-4733-9a1c-5d44fec4775b" providerId="ADAL" clId="{83F1AA9E-2B53-413F-86E1-8572658E8DE4}"/>
-    <pc:docChg chg="undo custSel addSld delSld modSld modMainMaster">
-      <pc:chgData name="Marcia Moraes" userId="c9c67e8a-58e2-4733-9a1c-5d44fec4775b" providerId="ADAL" clId="{83F1AA9E-2B53-413F-86E1-8572658E8DE4}" dt="2023-04-04T23:20:02.303" v="895" actId="20577"/>
+  </pc:docChgLst>
+  <pc:docChgLst>
+    <pc:chgData name="Marcia Moraes" userId="c9c67e8a-58e2-4733-9a1c-5d44fec4775b" providerId="ADAL" clId="{2F1B65FC-060D-42F8-8FEE-028F5DDA42EE}"/>
+    <pc:docChg chg="custSel modSld">
+      <pc:chgData name="Marcia Moraes" userId="c9c67e8a-58e2-4733-9a1c-5d44fec4775b" providerId="ADAL" clId="{2F1B65FC-060D-42F8-8FEE-028F5DDA42EE}" dt="2023-10-30T18:13:58.019" v="2"/>
       <pc:docMkLst>
         <pc:docMk/>
       </pc:docMkLst>
       <pc:sldChg chg="addSp delSp modSp">
-        <pc:chgData name="Marcia Moraes" userId="c9c67e8a-58e2-4733-9a1c-5d44fec4775b" providerId="ADAL" clId="{83F1AA9E-2B53-413F-86E1-8572658E8DE4}" dt="2023-04-04T19:07:26.258" v="185" actId="20577"/>
-        <pc:sldMkLst>
-          <pc:docMk/>
-          <pc:sldMk cId="2802481212" sldId="257"/>
-        </pc:sldMkLst>
-        <pc:spChg chg="add mod">
-          <ac:chgData name="Marcia Moraes" userId="c9c67e8a-58e2-4733-9a1c-5d44fec4775b" providerId="ADAL" clId="{83F1AA9E-2B53-413F-86E1-8572658E8DE4}" dt="2023-04-04T19:07:26.258" v="185" actId="20577"/>
-          <ac:spMkLst>
-            <pc:docMk/>
-            <pc:sldMk cId="2802481212" sldId="257"/>
-            <ac:spMk id="3" creationId="{9688D317-AF85-44B1-A186-F8334C0B02A8}"/>
-          </ac:spMkLst>
-        </pc:spChg>
-        <pc:spChg chg="mod">
-          <ac:chgData name="Marcia Moraes" userId="c9c67e8a-58e2-4733-9a1c-5d44fec4775b" providerId="ADAL" clId="{83F1AA9E-2B53-413F-86E1-8572658E8DE4}" dt="2023-04-04T19:06:53.010" v="184" actId="1076"/>
-          <ac:spMkLst>
-            <pc:docMk/>
-            <pc:sldMk cId="2802481212" sldId="257"/>
-            <ac:spMk id="4" creationId="{75E14BDD-66C0-C742-B76F-96253E7BC96A}"/>
-          </ac:spMkLst>
-        </pc:spChg>
-        <pc:spChg chg="del">
-          <ac:chgData name="Marcia Moraes" userId="c9c67e8a-58e2-4733-9a1c-5d44fec4775b" providerId="ADAL" clId="{83F1AA9E-2B53-413F-86E1-8572658E8DE4}" dt="2023-04-04T19:02:42.383" v="152" actId="478"/>
-          <ac:spMkLst>
-            <pc:docMk/>
-            <pc:sldMk cId="2802481212" sldId="257"/>
-            <ac:spMk id="5" creationId="{D233F2AE-C8B6-2240-930D-DE09FC1BA0EA}"/>
-          </ac:spMkLst>
-        </pc:spChg>
-        <pc:picChg chg="add mod">
-          <ac:chgData name="Marcia Moraes" userId="c9c67e8a-58e2-4733-9a1c-5d44fec4775b" providerId="ADAL" clId="{83F1AA9E-2B53-413F-86E1-8572658E8DE4}" dt="2023-04-04T19:04:41.370" v="159" actId="14100"/>
-          <ac:picMkLst>
-            <pc:docMk/>
-            <pc:sldMk cId="2802481212" sldId="257"/>
-            <ac:picMk id="6" creationId="{425008FA-1C99-459F-91DB-EDA0311E9735}"/>
-          </ac:picMkLst>
-        </pc:picChg>
-      </pc:sldChg>
-      <pc:sldChg chg="addSp delSp modSp">
-        <pc:chgData name="Marcia Moraes" userId="c9c67e8a-58e2-4733-9a1c-5d44fec4775b" providerId="ADAL" clId="{83F1AA9E-2B53-413F-86E1-8572658E8DE4}" dt="2023-04-04T20:15:24.118" v="799" actId="6549"/>
-        <pc:sldMkLst>
-          <pc:docMk/>
-          <pc:sldMk cId="1288397864" sldId="258"/>
-        </pc:sldMkLst>
-        <pc:spChg chg="del mod">
-          <ac:chgData name="Marcia Moraes" userId="c9c67e8a-58e2-4733-9a1c-5d44fec4775b" providerId="ADAL" clId="{83F1AA9E-2B53-413F-86E1-8572658E8DE4}" dt="2023-04-04T19:25:26.516" v="384" actId="478"/>
-          <ac:spMkLst>
-            <pc:docMk/>
-            <pc:sldMk cId="1288397864" sldId="258"/>
-            <ac:spMk id="3" creationId="{8ADDE47C-3111-224F-9585-14C199223706}"/>
-          </ac:spMkLst>
-        </pc:spChg>
-        <pc:spChg chg="mod">
-          <ac:chgData name="Marcia Moraes" userId="c9c67e8a-58e2-4733-9a1c-5d44fec4775b" providerId="ADAL" clId="{83F1AA9E-2B53-413F-86E1-8572658E8DE4}" dt="2023-04-04T20:15:24.118" v="799" actId="6549"/>
-          <ac:spMkLst>
-            <pc:docMk/>
-            <pc:sldMk cId="1288397864" sldId="258"/>
-            <ac:spMk id="4" creationId="{2753D634-348D-C24C-95EF-331EA7A9C6D0}"/>
-          </ac:spMkLst>
-        </pc:spChg>
-        <pc:spChg chg="del mod">
-          <ac:chgData name="Marcia Moraes" userId="c9c67e8a-58e2-4733-9a1c-5d44fec4775b" providerId="ADAL" clId="{83F1AA9E-2B53-413F-86E1-8572658E8DE4}" dt="2023-04-04T19:26:33.608" v="417" actId="478"/>
-          <ac:spMkLst>
-            <pc:docMk/>
-            <pc:sldMk cId="1288397864" sldId="258"/>
-            <ac:spMk id="5" creationId="{2FBB3C8D-9B0A-6242-91C1-86A8FCA0DD69}"/>
-          </ac:spMkLst>
-        </pc:spChg>
-        <pc:spChg chg="mod">
-          <ac:chgData name="Marcia Moraes" userId="c9c67e8a-58e2-4733-9a1c-5d44fec4775b" providerId="ADAL" clId="{83F1AA9E-2B53-413F-86E1-8572658E8DE4}" dt="2023-04-04T19:28:28.385" v="463" actId="20577"/>
-          <ac:spMkLst>
-            <pc:docMk/>
-            <pc:sldMk cId="1288397864" sldId="258"/>
-            <ac:spMk id="6" creationId="{3AC7EB62-9A7A-A64B-9F3B-2E007596F758}"/>
-          </ac:spMkLst>
-        </pc:spChg>
-        <pc:spChg chg="mod">
-          <ac:chgData name="Marcia Moraes" userId="c9c67e8a-58e2-4733-9a1c-5d44fec4775b" providerId="ADAL" clId="{83F1AA9E-2B53-413F-86E1-8572658E8DE4}" dt="2023-04-04T19:26:45.374" v="421" actId="1076"/>
-          <ac:spMkLst>
-            <pc:docMk/>
-            <pc:sldMk cId="1288397864" sldId="258"/>
-            <ac:spMk id="7" creationId="{A3A02B3D-AA1F-B14A-B654-7A0C099F32C6}"/>
-          </ac:spMkLst>
-        </pc:spChg>
-        <pc:spChg chg="add del mod">
-          <ac:chgData name="Marcia Moraes" userId="c9c67e8a-58e2-4733-9a1c-5d44fec4775b" providerId="ADAL" clId="{83F1AA9E-2B53-413F-86E1-8572658E8DE4}" dt="2023-04-04T19:25:30.371" v="385" actId="478"/>
-          <ac:spMkLst>
-            <pc:docMk/>
-            <pc:sldMk cId="1288397864" sldId="258"/>
-            <ac:spMk id="9" creationId="{A470C679-38AB-4F6A-A405-FB4D691D5426}"/>
-          </ac:spMkLst>
-        </pc:spChg>
-        <pc:spChg chg="mod">
-          <ac:chgData name="Marcia Moraes" userId="c9c67e8a-58e2-4733-9a1c-5d44fec4775b" providerId="ADAL" clId="{83F1AA9E-2B53-413F-86E1-8572658E8DE4}" dt="2023-04-04T19:29:28.786" v="524" actId="1076"/>
-          <ac:spMkLst>
-            <pc:docMk/>
-            <pc:sldMk cId="1288397864" sldId="258"/>
-            <ac:spMk id="13" creationId="{8479569A-9E0F-DE4A-AE87-5C25E30D02EB}"/>
-          </ac:spMkLst>
-        </pc:spChg>
-        <pc:spChg chg="mod">
-          <ac:chgData name="Marcia Moraes" userId="c9c67e8a-58e2-4733-9a1c-5d44fec4775b" providerId="ADAL" clId="{83F1AA9E-2B53-413F-86E1-8572658E8DE4}" dt="2023-04-04T19:26:54.446" v="423" actId="1076"/>
-          <ac:spMkLst>
-            <pc:docMk/>
-            <pc:sldMk cId="1288397864" sldId="258"/>
-            <ac:spMk id="22" creationId="{6487E792-1D8C-BE45-BBA8-A310D07E331C}"/>
-          </ac:spMkLst>
-        </pc:spChg>
-        <pc:spChg chg="mod">
-          <ac:chgData name="Marcia Moraes" userId="c9c67e8a-58e2-4733-9a1c-5d44fec4775b" providerId="ADAL" clId="{83F1AA9E-2B53-413F-86E1-8572658E8DE4}" dt="2023-04-04T19:28:44.102" v="466" actId="1076"/>
-          <ac:spMkLst>
-            <pc:docMk/>
-            <pc:sldMk cId="1288397864" sldId="258"/>
-            <ac:spMk id="23" creationId="{EDB275C6-E3B4-0849-A7DE-6D8BBF8CF688}"/>
-          </ac:spMkLst>
-        </pc:spChg>
-        <pc:cxnChg chg="mod">
-          <ac:chgData name="Marcia Moraes" userId="c9c67e8a-58e2-4733-9a1c-5d44fec4775b" providerId="ADAL" clId="{83F1AA9E-2B53-413F-86E1-8572658E8DE4}" dt="2023-04-04T19:27:13.976" v="426" actId="1076"/>
-          <ac:cxnSpMkLst>
-            <pc:docMk/>
-            <pc:sldMk cId="1288397864" sldId="258"/>
-            <ac:cxnSpMk id="11" creationId="{7709D324-26A4-8544-8CFE-97D74921D8B5}"/>
-          </ac:cxnSpMkLst>
-        </pc:cxnChg>
-        <pc:cxnChg chg="mod">
-          <ac:chgData name="Marcia Moraes" userId="c9c67e8a-58e2-4733-9a1c-5d44fec4775b" providerId="ADAL" clId="{83F1AA9E-2B53-413F-86E1-8572658E8DE4}" dt="2023-04-04T19:30:41.919" v="535" actId="14100"/>
-          <ac:cxnSpMkLst>
-            <pc:docMk/>
-            <pc:sldMk cId="1288397864" sldId="258"/>
-            <ac:cxnSpMk id="12" creationId="{27785196-4010-9C49-BDB3-7F6A0BBB9D6A}"/>
-          </ac:cxnSpMkLst>
-        </pc:cxnChg>
-        <pc:cxnChg chg="mod">
-          <ac:chgData name="Marcia Moraes" userId="c9c67e8a-58e2-4733-9a1c-5d44fec4775b" providerId="ADAL" clId="{83F1AA9E-2B53-413F-86E1-8572658E8DE4}" dt="2023-04-04T19:29:31.747" v="525" actId="14100"/>
-          <ac:cxnSpMkLst>
-            <pc:docMk/>
-            <pc:sldMk cId="1288397864" sldId="258"/>
-            <ac:cxnSpMk id="15" creationId="{106582B4-A856-6545-8528-3309EB15C1CD}"/>
-          </ac:cxnSpMkLst>
-        </pc:cxnChg>
-      </pc:sldChg>
-      <pc:sldChg chg="modSp">
-        <pc:chgData name="Marcia Moraes" userId="c9c67e8a-58e2-4733-9a1c-5d44fec4775b" providerId="ADAL" clId="{83F1AA9E-2B53-413F-86E1-8572658E8DE4}" dt="2023-04-04T19:34:38.049" v="611" actId="6549"/>
-        <pc:sldMkLst>
-          <pc:docMk/>
-          <pc:sldMk cId="2934444864" sldId="259"/>
-        </pc:sldMkLst>
-        <pc:spChg chg="mod">
-          <ac:chgData name="Marcia Moraes" userId="c9c67e8a-58e2-4733-9a1c-5d44fec4775b" providerId="ADAL" clId="{83F1AA9E-2B53-413F-86E1-8572658E8DE4}" dt="2023-04-04T19:33:50.320" v="550" actId="1076"/>
-          <ac:spMkLst>
-            <pc:docMk/>
-            <pc:sldMk cId="2934444864" sldId="259"/>
-            <ac:spMk id="2" creationId="{0EA0677C-5E9D-BA45-B9ED-0DB234643271}"/>
-          </ac:spMkLst>
-        </pc:spChg>
-        <pc:spChg chg="mod">
-          <ac:chgData name="Marcia Moraes" userId="c9c67e8a-58e2-4733-9a1c-5d44fec4775b" providerId="ADAL" clId="{83F1AA9E-2B53-413F-86E1-8572658E8DE4}" dt="2023-04-04T19:34:38.049" v="611" actId="6549"/>
-          <ac:spMkLst>
-            <pc:docMk/>
-            <pc:sldMk cId="2934444864" sldId="259"/>
-            <ac:spMk id="3" creationId="{201C55D7-A9DA-6843-81F0-3A1F6B9F9405}"/>
-          </ac:spMkLst>
-        </pc:spChg>
-      </pc:sldChg>
-      <pc:sldChg chg="delSp modSp delAnim">
-        <pc:chgData name="Marcia Moraes" userId="c9c67e8a-58e2-4733-9a1c-5d44fec4775b" providerId="ADAL" clId="{83F1AA9E-2B53-413F-86E1-8572658E8DE4}" dt="2023-04-04T19:40:55.818" v="675" actId="14100"/>
-        <pc:sldMkLst>
-          <pc:docMk/>
-          <pc:sldMk cId="2151088149" sldId="260"/>
-        </pc:sldMkLst>
-        <pc:spChg chg="mod">
-          <ac:chgData name="Marcia Moraes" userId="c9c67e8a-58e2-4733-9a1c-5d44fec4775b" providerId="ADAL" clId="{83F1AA9E-2B53-413F-86E1-8572658E8DE4}" dt="2023-04-04T19:39:04.788" v="668" actId="1076"/>
-          <ac:spMkLst>
-            <pc:docMk/>
-            <pc:sldMk cId="2151088149" sldId="260"/>
-            <ac:spMk id="2" creationId="{57A77487-CC87-DA49-8E5F-0F62A0E3A308}"/>
-          </ac:spMkLst>
-        </pc:spChg>
-        <pc:spChg chg="mod">
-          <ac:chgData name="Marcia Moraes" userId="c9c67e8a-58e2-4733-9a1c-5d44fec4775b" providerId="ADAL" clId="{83F1AA9E-2B53-413F-86E1-8572658E8DE4}" dt="2023-04-04T19:37:42.469" v="651" actId="6549"/>
-          <ac:spMkLst>
-            <pc:docMk/>
-            <pc:sldMk cId="2151088149" sldId="260"/>
-            <ac:spMk id="5" creationId="{BE4C7B9E-3EFB-2340-ABD4-8D39A4ADE720}"/>
-          </ac:spMkLst>
-        </pc:spChg>
-        <pc:spChg chg="mod">
-          <ac:chgData name="Marcia Moraes" userId="c9c67e8a-58e2-4733-9a1c-5d44fec4775b" providerId="ADAL" clId="{83F1AA9E-2B53-413F-86E1-8572658E8DE4}" dt="2023-04-04T19:35:48.228" v="626" actId="1076"/>
-          <ac:spMkLst>
-            <pc:docMk/>
-            <pc:sldMk cId="2151088149" sldId="260"/>
-            <ac:spMk id="6" creationId="{4FD49591-C34D-0B41-AAFD-518E9636BE6D}"/>
-          </ac:spMkLst>
-        </pc:spChg>
-        <pc:spChg chg="mod">
-          <ac:chgData name="Marcia Moraes" userId="c9c67e8a-58e2-4733-9a1c-5d44fec4775b" providerId="ADAL" clId="{83F1AA9E-2B53-413F-86E1-8572658E8DE4}" dt="2023-04-04T19:35:37.708" v="622" actId="14100"/>
-          <ac:spMkLst>
-            <pc:docMk/>
-            <pc:sldMk cId="2151088149" sldId="260"/>
-            <ac:spMk id="7" creationId="{A7A887AF-9028-4142-8EBF-5736A210D279}"/>
-          </ac:spMkLst>
-        </pc:spChg>
-        <pc:spChg chg="del mod">
-          <ac:chgData name="Marcia Moraes" userId="c9c67e8a-58e2-4733-9a1c-5d44fec4775b" providerId="ADAL" clId="{83F1AA9E-2B53-413F-86E1-8572658E8DE4}" dt="2023-04-04T19:36:39.198" v="631" actId="478"/>
-          <ac:spMkLst>
-            <pc:docMk/>
-            <pc:sldMk cId="2151088149" sldId="260"/>
-            <ac:spMk id="8" creationId="{D0FD6FF1-FFA7-ED49-B467-D7F16E17A7CC}"/>
-          </ac:spMkLst>
-        </pc:spChg>
-        <pc:spChg chg="mod">
-          <ac:chgData name="Marcia Moraes" userId="c9c67e8a-58e2-4733-9a1c-5d44fec4775b" providerId="ADAL" clId="{83F1AA9E-2B53-413F-86E1-8572658E8DE4}" dt="2023-04-04T19:38:25.112" v="663" actId="1076"/>
-          <ac:spMkLst>
-            <pc:docMk/>
-            <pc:sldMk cId="2151088149" sldId="260"/>
-            <ac:spMk id="11" creationId="{9ABCE009-75DA-934C-B0CB-AE336D59A2F0}"/>
-          </ac:spMkLst>
-        </pc:spChg>
-        <pc:spChg chg="mod">
-          <ac:chgData name="Marcia Moraes" userId="c9c67e8a-58e2-4733-9a1c-5d44fec4775b" providerId="ADAL" clId="{83F1AA9E-2B53-413F-86E1-8572658E8DE4}" dt="2023-04-04T19:38:28.716" v="665" actId="14100"/>
-          <ac:spMkLst>
-            <pc:docMk/>
-            <pc:sldMk cId="2151088149" sldId="260"/>
-            <ac:spMk id="12" creationId="{7FD8EBAF-7B58-7143-BB18-B8A486F182B0}"/>
-          </ac:spMkLst>
-        </pc:spChg>
-        <pc:spChg chg="mod">
-          <ac:chgData name="Marcia Moraes" userId="c9c67e8a-58e2-4733-9a1c-5d44fec4775b" providerId="ADAL" clId="{83F1AA9E-2B53-413F-86E1-8572658E8DE4}" dt="2023-04-04T19:38:17.986" v="661" actId="14100"/>
-          <ac:spMkLst>
-            <pc:docMk/>
-            <pc:sldMk cId="2151088149" sldId="260"/>
-            <ac:spMk id="13" creationId="{7DC7A28B-FC27-E044-B149-10A7FC512CC6}"/>
-          </ac:spMkLst>
-        </pc:spChg>
-        <pc:spChg chg="mod">
-          <ac:chgData name="Marcia Moraes" userId="c9c67e8a-58e2-4733-9a1c-5d44fec4775b" providerId="ADAL" clId="{83F1AA9E-2B53-413F-86E1-8572658E8DE4}" dt="2023-04-04T19:37:50.417" v="653" actId="14100"/>
-          <ac:spMkLst>
-            <pc:docMk/>
-            <pc:sldMk cId="2151088149" sldId="260"/>
-            <ac:spMk id="14" creationId="{C19C4A1C-27BC-D54E-B26D-D1B82B40490E}"/>
-          </ac:spMkLst>
-        </pc:spChg>
-        <pc:cxnChg chg="mod">
-          <ac:chgData name="Marcia Moraes" userId="c9c67e8a-58e2-4733-9a1c-5d44fec4775b" providerId="ADAL" clId="{83F1AA9E-2B53-413F-86E1-8572658E8DE4}" dt="2023-04-04T19:40:55.818" v="675" actId="14100"/>
-          <ac:cxnSpMkLst>
-            <pc:docMk/>
-            <pc:sldMk cId="2151088149" sldId="260"/>
-            <ac:cxnSpMk id="10" creationId="{D0E5740D-DE5D-FF45-AA91-A2B7733FAC33}"/>
-          </ac:cxnSpMkLst>
-        </pc:cxnChg>
-        <pc:cxnChg chg="mod">
-          <ac:chgData name="Marcia Moraes" userId="c9c67e8a-58e2-4733-9a1c-5d44fec4775b" providerId="ADAL" clId="{83F1AA9E-2B53-413F-86E1-8572658E8DE4}" dt="2023-04-04T19:38:35.739" v="667" actId="14100"/>
-          <ac:cxnSpMkLst>
-            <pc:docMk/>
-            <pc:sldMk cId="2151088149" sldId="260"/>
-            <ac:cxnSpMk id="16" creationId="{57CDDADD-FDED-6B43-A32D-ACCC8AC5BE5C}"/>
-          </ac:cxnSpMkLst>
-        </pc:cxnChg>
-        <pc:cxnChg chg="mod">
-          <ac:chgData name="Marcia Moraes" userId="c9c67e8a-58e2-4733-9a1c-5d44fec4775b" providerId="ADAL" clId="{83F1AA9E-2B53-413F-86E1-8572658E8DE4}" dt="2023-04-04T19:38:32.472" v="666" actId="14100"/>
-          <ac:cxnSpMkLst>
-            <pc:docMk/>
-            <pc:sldMk cId="2151088149" sldId="260"/>
-            <ac:cxnSpMk id="19" creationId="{402A9B27-87A1-C44E-B48C-BC1294F87C41}"/>
-          </ac:cxnSpMkLst>
-        </pc:cxnChg>
-      </pc:sldChg>
-      <pc:sldChg chg="modSp">
-        <pc:chgData name="Marcia Moraes" userId="c9c67e8a-58e2-4733-9a1c-5d44fec4775b" providerId="ADAL" clId="{83F1AA9E-2B53-413F-86E1-8572658E8DE4}" dt="2023-04-04T22:59:55.955" v="825" actId="14100"/>
-        <pc:sldMkLst>
-          <pc:docMk/>
-          <pc:sldMk cId="3424854019" sldId="261"/>
-        </pc:sldMkLst>
-        <pc:spChg chg="mod">
-          <ac:chgData name="Marcia Moraes" userId="c9c67e8a-58e2-4733-9a1c-5d44fec4775b" providerId="ADAL" clId="{83F1AA9E-2B53-413F-86E1-8572658E8DE4}" dt="2023-04-04T19:56:39.159" v="685" actId="1076"/>
-          <ac:spMkLst>
-            <pc:docMk/>
-            <pc:sldMk cId="3424854019" sldId="261"/>
-            <ac:spMk id="2" creationId="{E24C4D79-9845-0F43-9D51-3A0D68B4A7F3}"/>
-          </ac:spMkLst>
-        </pc:spChg>
-        <pc:spChg chg="mod">
-          <ac:chgData name="Marcia Moraes" userId="c9c67e8a-58e2-4733-9a1c-5d44fec4775b" providerId="ADAL" clId="{83F1AA9E-2B53-413F-86E1-8572658E8DE4}" dt="2023-04-04T19:57:54.407" v="711" actId="14100"/>
-          <ac:spMkLst>
-            <pc:docMk/>
-            <pc:sldMk cId="3424854019" sldId="261"/>
-            <ac:spMk id="3" creationId="{47D74261-9D4E-8043-B97D-FE2185C21E1C}"/>
-          </ac:spMkLst>
-        </pc:spChg>
-        <pc:spChg chg="mod">
-          <ac:chgData name="Marcia Moraes" userId="c9c67e8a-58e2-4733-9a1c-5d44fec4775b" providerId="ADAL" clId="{83F1AA9E-2B53-413F-86E1-8572658E8DE4}" dt="2023-04-04T22:59:52.752" v="824" actId="108"/>
-          <ac:spMkLst>
-            <pc:docMk/>
-            <pc:sldMk cId="3424854019" sldId="261"/>
-            <ac:spMk id="4" creationId="{201C467F-92E5-544B-8E2A-14E365549C3F}"/>
-          </ac:spMkLst>
-        </pc:spChg>
-        <pc:spChg chg="mod">
-          <ac:chgData name="Marcia Moraes" userId="c9c67e8a-58e2-4733-9a1c-5d44fec4775b" providerId="ADAL" clId="{83F1AA9E-2B53-413F-86E1-8572658E8DE4}" dt="2023-04-04T19:57:05.381" v="690" actId="1076"/>
-          <ac:spMkLst>
-            <pc:docMk/>
-            <pc:sldMk cId="3424854019" sldId="261"/>
-            <ac:spMk id="6" creationId="{A78CB236-2CE3-AB47-8999-5BFBBB2FE888}"/>
-          </ac:spMkLst>
-        </pc:spChg>
-        <pc:spChg chg="mod">
-          <ac:chgData name="Marcia Moraes" userId="c9c67e8a-58e2-4733-9a1c-5d44fec4775b" providerId="ADAL" clId="{83F1AA9E-2B53-413F-86E1-8572658E8DE4}" dt="2023-04-04T19:57:41.272" v="710" actId="14100"/>
-          <ac:spMkLst>
-            <pc:docMk/>
-            <pc:sldMk cId="3424854019" sldId="261"/>
-            <ac:spMk id="7" creationId="{D8C8C3A9-FE13-DD46-98C6-6407B514C5A9}"/>
-          </ac:spMkLst>
-        </pc:spChg>
-        <pc:cxnChg chg="mod">
-          <ac:chgData name="Marcia Moraes" userId="c9c67e8a-58e2-4733-9a1c-5d44fec4775b" providerId="ADAL" clId="{83F1AA9E-2B53-413F-86E1-8572658E8DE4}" dt="2023-04-04T22:59:55.955" v="825" actId="14100"/>
-          <ac:cxnSpMkLst>
-            <pc:docMk/>
-            <pc:sldMk cId="3424854019" sldId="261"/>
-            <ac:cxnSpMk id="9" creationId="{26B1F70E-60BA-864A-842C-E4A7C7DA45CC}"/>
-          </ac:cxnSpMkLst>
-        </pc:cxnChg>
-      </pc:sldChg>
-      <pc:sldChg chg="modSp">
-        <pc:chgData name="Marcia Moraes" userId="c9c67e8a-58e2-4733-9a1c-5d44fec4775b" providerId="ADAL" clId="{83F1AA9E-2B53-413F-86E1-8572658E8DE4}" dt="2023-04-04T22:48:29.116" v="808" actId="20577"/>
-        <pc:sldMkLst>
-          <pc:docMk/>
-          <pc:sldMk cId="2994398508" sldId="262"/>
-        </pc:sldMkLst>
-        <pc:spChg chg="mod">
-          <ac:chgData name="Marcia Moraes" userId="c9c67e8a-58e2-4733-9a1c-5d44fec4775b" providerId="ADAL" clId="{83F1AA9E-2B53-413F-86E1-8572658E8DE4}" dt="2023-04-04T19:32:07.996" v="540" actId="20577"/>
-          <ac:spMkLst>
-            <pc:docMk/>
-            <pc:sldMk cId="2994398508" sldId="262"/>
-            <ac:spMk id="5" creationId="{0A6AD85F-6D71-420D-9CF4-AFEA9B4374F9}"/>
-          </ac:spMkLst>
-        </pc:spChg>
-        <pc:spChg chg="mod">
-          <ac:chgData name="Marcia Moraes" userId="c9c67e8a-58e2-4733-9a1c-5d44fec4775b" providerId="ADAL" clId="{83F1AA9E-2B53-413F-86E1-8572658E8DE4}" dt="2023-04-04T22:40:46.011" v="802" actId="20577"/>
-          <ac:spMkLst>
-            <pc:docMk/>
-            <pc:sldMk cId="2994398508" sldId="262"/>
-            <ac:spMk id="10" creationId="{783ADDED-1481-4660-A8D6-11DC6BCDB5CF}"/>
-          </ac:spMkLst>
-        </pc:spChg>
-        <pc:spChg chg="mod">
-          <ac:chgData name="Marcia Moraes" userId="c9c67e8a-58e2-4733-9a1c-5d44fec4775b" providerId="ADAL" clId="{83F1AA9E-2B53-413F-86E1-8572658E8DE4}" dt="2023-04-04T22:48:20.491" v="805" actId="20577"/>
-          <ac:spMkLst>
-            <pc:docMk/>
-            <pc:sldMk cId="2994398508" sldId="262"/>
-            <ac:spMk id="15" creationId="{4DE9E1B7-5B2E-48DB-8698-BB14D000CC3A}"/>
-          </ac:spMkLst>
-        </pc:spChg>
-        <pc:spChg chg="mod">
-          <ac:chgData name="Marcia Moraes" userId="c9c67e8a-58e2-4733-9a1c-5d44fec4775b" providerId="ADAL" clId="{83F1AA9E-2B53-413F-86E1-8572658E8DE4}" dt="2023-04-04T22:48:29.116" v="808" actId="20577"/>
-          <ac:spMkLst>
-            <pc:docMk/>
-            <pc:sldMk cId="2994398508" sldId="262"/>
-            <ac:spMk id="21" creationId="{7E2E6D36-BB32-497D-9F5F-231FA657E416}"/>
-          </ac:spMkLst>
-        </pc:spChg>
-      </pc:sldChg>
-      <pc:sldChg chg="addSp modSp">
-        <pc:chgData name="Marcia Moraes" userId="c9c67e8a-58e2-4733-9a1c-5d44fec4775b" providerId="ADAL" clId="{83F1AA9E-2B53-413F-86E1-8572658E8DE4}" dt="2023-04-04T23:20:02.303" v="895" actId="20577"/>
-        <pc:sldMkLst>
-          <pc:docMk/>
-          <pc:sldMk cId="2436844951" sldId="263"/>
-        </pc:sldMkLst>
-        <pc:spChg chg="mod">
-          <ac:chgData name="Marcia Moraes" userId="c9c67e8a-58e2-4733-9a1c-5d44fec4775b" providerId="ADAL" clId="{83F1AA9E-2B53-413F-86E1-8572658E8DE4}" dt="2023-04-04T19:58:07.247" v="712" actId="1076"/>
-          <ac:spMkLst>
-            <pc:docMk/>
-            <pc:sldMk cId="2436844951" sldId="263"/>
-            <ac:spMk id="2" creationId="{0EA0677C-5E9D-BA45-B9ED-0DB234643271}"/>
-          </ac:spMkLst>
-        </pc:spChg>
-        <pc:spChg chg="add mod">
-          <ac:chgData name="Marcia Moraes" userId="c9c67e8a-58e2-4733-9a1c-5d44fec4775b" providerId="ADAL" clId="{83F1AA9E-2B53-413F-86E1-8572658E8DE4}" dt="2023-04-04T23:20:02.303" v="895" actId="20577"/>
-          <ac:spMkLst>
-            <pc:docMk/>
-            <pc:sldMk cId="2436844951" sldId="263"/>
-            <ac:spMk id="4" creationId="{E047C3B2-5DEF-460B-952F-AF595C96AC07}"/>
-          </ac:spMkLst>
-        </pc:spChg>
-        <pc:spChg chg="mod">
-          <ac:chgData name="Marcia Moraes" userId="c9c67e8a-58e2-4733-9a1c-5d44fec4775b" providerId="ADAL" clId="{83F1AA9E-2B53-413F-86E1-8572658E8DE4}" dt="2023-04-04T23:19:22.217" v="828" actId="1076"/>
-          <ac:spMkLst>
-            <pc:docMk/>
-            <pc:sldMk cId="2436844951" sldId="263"/>
-            <ac:spMk id="5" creationId="{0A6AD85F-6D71-420D-9CF4-AFEA9B4374F9}"/>
-          </ac:spMkLst>
-        </pc:spChg>
-        <pc:spChg chg="mod">
-          <ac:chgData name="Marcia Moraes" userId="c9c67e8a-58e2-4733-9a1c-5d44fec4775b" providerId="ADAL" clId="{83F1AA9E-2B53-413F-86E1-8572658E8DE4}" dt="2023-04-04T19:59:06.894" v="747" actId="20577"/>
-          <ac:spMkLst>
-            <pc:docMk/>
-            <pc:sldMk cId="2436844951" sldId="263"/>
-            <ac:spMk id="21" creationId="{7E2E6D36-BB32-497D-9F5F-231FA657E416}"/>
-          </ac:spMkLst>
-        </pc:spChg>
-        <pc:grpChg chg="mod">
-          <ac:chgData name="Marcia Moraes" userId="c9c67e8a-58e2-4733-9a1c-5d44fec4775b" providerId="ADAL" clId="{83F1AA9E-2B53-413F-86E1-8572658E8DE4}" dt="2023-04-04T23:19:16.731" v="827" actId="1076"/>
-          <ac:grpSpMkLst>
-            <pc:docMk/>
-            <pc:sldMk cId="2436844951" sldId="263"/>
-            <ac:grpSpMk id="16" creationId="{4C5FB7FF-BAFB-4D54-9981-06A67064EA38}"/>
-          </ac:grpSpMkLst>
-        </pc:grpChg>
-      </pc:sldChg>
-      <pc:sldChg chg="del">
-        <pc:chgData name="Marcia Moraes" userId="c9c67e8a-58e2-4733-9a1c-5d44fec4775b" providerId="ADAL" clId="{83F1AA9E-2B53-413F-86E1-8572658E8DE4}" dt="2023-04-04T19:02:24.075" v="131" actId="2696"/>
-        <pc:sldMkLst>
-          <pc:docMk/>
-          <pc:sldMk cId="926474781" sldId="271"/>
-        </pc:sldMkLst>
-      </pc:sldChg>
-      <pc:sldChg chg="addSp delSp modSp">
-        <pc:chgData name="Marcia Moraes" userId="c9c67e8a-58e2-4733-9a1c-5d44fec4775b" providerId="ADAL" clId="{83F1AA9E-2B53-413F-86E1-8572658E8DE4}" dt="2023-04-04T19:01:43.371" v="130" actId="20577"/>
+        <pc:chgData name="Marcia Moraes" userId="c9c67e8a-58e2-4733-9a1c-5d44fec4775b" providerId="ADAL" clId="{2F1B65FC-060D-42F8-8FEE-028F5DDA42EE}" dt="2023-10-30T18:13:58.019" v="2"/>
         <pc:sldMkLst>
           <pc:docMk/>
           <pc:sldMk cId="2571368551" sldId="272"/>
         </pc:sldMkLst>
         <pc:spChg chg="del">
-          <ac:chgData name="Marcia Moraes" userId="c9c67e8a-58e2-4733-9a1c-5d44fec4775b" providerId="ADAL" clId="{83F1AA9E-2B53-413F-86E1-8572658E8DE4}" dt="2023-04-04T19:00:34.700" v="6" actId="478"/>
+          <ac:chgData name="Marcia Moraes" userId="c9c67e8a-58e2-4733-9a1c-5d44fec4775b" providerId="ADAL" clId="{2F1B65FC-060D-42F8-8FEE-028F5DDA42EE}" dt="2023-10-30T18:13:45.002" v="1" actId="478"/>
           <ac:spMkLst>
             <pc:docMk/>
             <pc:sldMk cId="2571368551" sldId="272"/>
-            <ac:spMk id="2" creationId="{84CD52E7-9878-46B0-B322-12FDC9581986}"/>
+            <ac:spMk id="5" creationId="{1E54CBCD-3447-4F03-970A-F1628F46BEF2}"/>
           </ac:spMkLst>
         </pc:spChg>
-        <pc:spChg chg="add mod">
-          <ac:chgData name="Marcia Moraes" userId="c9c67e8a-58e2-4733-9a1c-5d44fec4775b" providerId="ADAL" clId="{83F1AA9E-2B53-413F-86E1-8572658E8DE4}" dt="2023-04-04T19:01:43.371" v="130" actId="20577"/>
+        <pc:spChg chg="mod">
+          <ac:chgData name="Marcia Moraes" userId="c9c67e8a-58e2-4733-9a1c-5d44fec4775b" providerId="ADAL" clId="{2F1B65FC-060D-42F8-8FEE-028F5DDA42EE}" dt="2023-10-30T18:13:40.473" v="0" actId="20577"/>
           <ac:spMkLst>
             <pc:docMk/>
             <pc:sldMk cId="2571368551" sldId="272"/>
@@ -591,165 +178,22 @@
           </ac:spMkLst>
         </pc:spChg>
         <pc:spChg chg="add">
-          <ac:chgData name="Marcia Moraes" userId="c9c67e8a-58e2-4733-9a1c-5d44fec4775b" providerId="ADAL" clId="{83F1AA9E-2B53-413F-86E1-8572658E8DE4}" dt="2023-04-04T18:59:52.795" v="1"/>
+          <ac:chgData name="Marcia Moraes" userId="c9c67e8a-58e2-4733-9a1c-5d44fec4775b" providerId="ADAL" clId="{2F1B65FC-060D-42F8-8FEE-028F5DDA42EE}" dt="2023-10-30T18:13:58.019" v="2"/>
           <ac:spMkLst>
             <pc:docMk/>
             <pc:sldMk cId="2571368551" sldId="272"/>
-            <ac:spMk id="8" creationId="{4C9F7FF9-136C-43A9-8EBE-3AE6DB6A86E0}"/>
+            <ac:spMk id="10" creationId="{66555DE1-A8B6-487A-A5B5-393C7779DC95}"/>
           </ac:spMkLst>
         </pc:spChg>
-        <pc:spChg chg="del">
-          <ac:chgData name="Marcia Moraes" userId="c9c67e8a-58e2-4733-9a1c-5d44fec4775b" providerId="ADAL" clId="{83F1AA9E-2B53-413F-86E1-8572658E8DE4}" dt="2023-04-04T18:59:52.315" v="0" actId="478"/>
-          <ac:spMkLst>
+        <pc:graphicFrameChg chg="add">
+          <ac:chgData name="Marcia Moraes" userId="c9c67e8a-58e2-4733-9a1c-5d44fec4775b" providerId="ADAL" clId="{2F1B65FC-060D-42F8-8FEE-028F5DDA42EE}" dt="2023-10-30T18:13:58.019" v="2"/>
+          <ac:graphicFrameMkLst>
             <pc:docMk/>
             <pc:sldMk cId="2571368551" sldId="272"/>
-            <ac:spMk id="11" creationId="{BDA0DBC1-29A7-4498-B9AA-9B174D0FEC3E}"/>
-          </ac:spMkLst>
-        </pc:spChg>
-        <pc:picChg chg="add mod">
-          <ac:chgData name="Marcia Moraes" userId="c9c67e8a-58e2-4733-9a1c-5d44fec4775b" providerId="ADAL" clId="{83F1AA9E-2B53-413F-86E1-8572658E8DE4}" dt="2023-04-04T19:00:30.007" v="5" actId="1076"/>
-          <ac:picMkLst>
-            <pc:docMk/>
-            <pc:sldMk cId="2571368551" sldId="272"/>
-            <ac:picMk id="9" creationId="{498EB895-EF8A-443A-9500-8E94466A0509}"/>
-          </ac:picMkLst>
-        </pc:picChg>
-        <pc:picChg chg="del">
-          <ac:chgData name="Marcia Moraes" userId="c9c67e8a-58e2-4733-9a1c-5d44fec4775b" providerId="ADAL" clId="{83F1AA9E-2B53-413F-86E1-8572658E8DE4}" dt="2023-04-04T19:00:23.138" v="2" actId="478"/>
-          <ac:picMkLst>
-            <pc:docMk/>
-            <pc:sldMk cId="2571368551" sldId="272"/>
-            <ac:picMk id="1026" creationId="{76F90ADF-7BC1-487D-A39C-C9BE9DA546D3}"/>
-          </ac:picMkLst>
-        </pc:picChg>
+            <ac:graphicFrameMk id="11" creationId="{921825B0-08B4-4D5E-BD7F-5A0D8BA13775}"/>
+          </ac:graphicFrameMkLst>
+        </pc:graphicFrameChg>
       </pc:sldChg>
-      <pc:sldChg chg="addSp modSp add">
-        <pc:chgData name="Marcia Moraes" userId="c9c67e8a-58e2-4733-9a1c-5d44fec4775b" providerId="ADAL" clId="{83F1AA9E-2B53-413F-86E1-8572658E8DE4}" dt="2023-04-04T19:19:53.779" v="335" actId="255"/>
-        <pc:sldMkLst>
-          <pc:docMk/>
-          <pc:sldMk cId="533635658" sldId="273"/>
-        </pc:sldMkLst>
-        <pc:spChg chg="mod">
-          <ac:chgData name="Marcia Moraes" userId="c9c67e8a-58e2-4733-9a1c-5d44fec4775b" providerId="ADAL" clId="{83F1AA9E-2B53-413F-86E1-8572658E8DE4}" dt="2023-04-04T19:19:26.651" v="333" actId="1076"/>
-          <ac:spMkLst>
-            <pc:docMk/>
-            <pc:sldMk cId="533635658" sldId="273"/>
-            <ac:spMk id="4" creationId="{75E14BDD-66C0-C742-B76F-96253E7BC96A}"/>
-          </ac:spMkLst>
-        </pc:spChg>
-        <pc:spChg chg="mod">
-          <ac:chgData name="Marcia Moraes" userId="c9c67e8a-58e2-4733-9a1c-5d44fec4775b" providerId="ADAL" clId="{83F1AA9E-2B53-413F-86E1-8572658E8DE4}" dt="2023-04-04T19:19:53.779" v="335" actId="255"/>
-          <ac:spMkLst>
-            <pc:docMk/>
-            <pc:sldMk cId="533635658" sldId="273"/>
-            <ac:spMk id="5" creationId="{D233F2AE-C8B6-2240-930D-DE09FC1BA0EA}"/>
-          </ac:spMkLst>
-        </pc:spChg>
-        <pc:picChg chg="add mod">
-          <ac:chgData name="Marcia Moraes" userId="c9c67e8a-58e2-4733-9a1c-5d44fec4775b" providerId="ADAL" clId="{83F1AA9E-2B53-413F-86E1-8572658E8DE4}" dt="2023-04-04T19:18:04.605" v="256" actId="1076"/>
-          <ac:picMkLst>
-            <pc:docMk/>
-            <pc:sldMk cId="533635658" sldId="273"/>
-            <ac:picMk id="2" creationId="{ECCAC9AE-70A7-466E-A94A-21B2EAA1756A}"/>
-          </ac:picMkLst>
-        </pc:picChg>
-      </pc:sldChg>
-      <pc:sldChg chg="modSp add">
-        <pc:chgData name="Marcia Moraes" userId="c9c67e8a-58e2-4733-9a1c-5d44fec4775b" providerId="ADAL" clId="{83F1AA9E-2B53-413F-86E1-8572658E8DE4}" dt="2023-04-04T19:21:53.832" v="378" actId="6549"/>
-        <pc:sldMkLst>
-          <pc:docMk/>
-          <pc:sldMk cId="2099014466" sldId="274"/>
-        </pc:sldMkLst>
-        <pc:spChg chg="mod">
-          <ac:chgData name="Marcia Moraes" userId="c9c67e8a-58e2-4733-9a1c-5d44fec4775b" providerId="ADAL" clId="{83F1AA9E-2B53-413F-86E1-8572658E8DE4}" dt="2023-04-04T19:21:05.548" v="342" actId="1076"/>
-          <ac:spMkLst>
-            <pc:docMk/>
-            <pc:sldMk cId="2099014466" sldId="274"/>
-            <ac:spMk id="4" creationId="{75E14BDD-66C0-C742-B76F-96253E7BC96A}"/>
-          </ac:spMkLst>
-        </pc:spChg>
-        <pc:spChg chg="mod">
-          <ac:chgData name="Marcia Moraes" userId="c9c67e8a-58e2-4733-9a1c-5d44fec4775b" providerId="ADAL" clId="{83F1AA9E-2B53-413F-86E1-8572658E8DE4}" dt="2023-04-04T19:21:53.832" v="378" actId="6549"/>
-          <ac:spMkLst>
-            <pc:docMk/>
-            <pc:sldMk cId="2099014466" sldId="274"/>
-            <ac:spMk id="5" creationId="{D233F2AE-C8B6-2240-930D-DE09FC1BA0EA}"/>
-          </ac:spMkLst>
-        </pc:spChg>
-      </pc:sldChg>
-      <pc:sldChg chg="addSp modSp add">
-        <pc:chgData name="Marcia Moraes" userId="c9c67e8a-58e2-4733-9a1c-5d44fec4775b" providerId="ADAL" clId="{83F1AA9E-2B53-413F-86E1-8572658E8DE4}" dt="2023-04-04T19:20:40.754" v="339" actId="1076"/>
-        <pc:sldMkLst>
-          <pc:docMk/>
-          <pc:sldMk cId="1170660310" sldId="275"/>
-        </pc:sldMkLst>
-        <pc:spChg chg="mod">
-          <ac:chgData name="Marcia Moraes" userId="c9c67e8a-58e2-4733-9a1c-5d44fec4775b" providerId="ADAL" clId="{83F1AA9E-2B53-413F-86E1-8572658E8DE4}" dt="2023-04-04T19:20:09.945" v="336" actId="313"/>
-          <ac:spMkLst>
-            <pc:docMk/>
-            <pc:sldMk cId="1170660310" sldId="275"/>
-            <ac:spMk id="4" creationId="{75E14BDD-66C0-C742-B76F-96253E7BC96A}"/>
-          </ac:spMkLst>
-        </pc:spChg>
-        <pc:spChg chg="mod">
-          <ac:chgData name="Marcia Moraes" userId="c9c67e8a-58e2-4733-9a1c-5d44fec4775b" providerId="ADAL" clId="{83F1AA9E-2B53-413F-86E1-8572658E8DE4}" dt="2023-04-04T19:17:04.561" v="251" actId="6549"/>
-          <ac:spMkLst>
-            <pc:docMk/>
-            <pc:sldMk cId="1170660310" sldId="275"/>
-            <ac:spMk id="5" creationId="{D233F2AE-C8B6-2240-930D-DE09FC1BA0EA}"/>
-          </ac:spMkLst>
-        </pc:spChg>
-        <pc:picChg chg="add mod">
-          <ac:chgData name="Marcia Moraes" userId="c9c67e8a-58e2-4733-9a1c-5d44fec4775b" providerId="ADAL" clId="{83F1AA9E-2B53-413F-86E1-8572658E8DE4}" dt="2023-04-04T19:20:40.754" v="339" actId="1076"/>
-          <ac:picMkLst>
-            <pc:docMk/>
-            <pc:sldMk cId="1170660310" sldId="275"/>
-            <ac:picMk id="2" creationId="{142C584A-DDA1-4EE4-BFFA-DA8C72CEDF2D}"/>
-          </ac:picMkLst>
-        </pc:picChg>
-      </pc:sldChg>
-      <pc:sldMasterChg chg="modSldLayout">
-        <pc:chgData name="Marcia Moraes" userId="c9c67e8a-58e2-4733-9a1c-5d44fec4775b" providerId="ADAL" clId="{83F1AA9E-2B53-413F-86E1-8572658E8DE4}" dt="2023-04-04T19:01:29.532" v="127" actId="20577"/>
-        <pc:sldMasterMkLst>
-          <pc:docMk/>
-          <pc:sldMasterMk cId="3965733437" sldId="2147483648"/>
-        </pc:sldMasterMkLst>
-        <pc:sldLayoutChg chg="modSp">
-          <pc:chgData name="Marcia Moraes" userId="c9c67e8a-58e2-4733-9a1c-5d44fec4775b" providerId="ADAL" clId="{83F1AA9E-2B53-413F-86E1-8572658E8DE4}" dt="2023-04-04T19:01:29.532" v="127" actId="20577"/>
-          <pc:sldLayoutMkLst>
-            <pc:docMk/>
-            <pc:sldMasterMk cId="3965733437" sldId="2147483648"/>
-            <pc:sldLayoutMk cId="0" sldId="2147483689"/>
-          </pc:sldLayoutMkLst>
-          <pc:spChg chg="mod">
-            <ac:chgData name="Marcia Moraes" userId="c9c67e8a-58e2-4733-9a1c-5d44fec4775b" providerId="ADAL" clId="{83F1AA9E-2B53-413F-86E1-8572658E8DE4}" dt="2023-04-04T19:00:49.807" v="8" actId="1076"/>
-            <ac:spMkLst>
-              <pc:docMk/>
-              <pc:sldMasterMk cId="3965733437" sldId="2147483648"/>
-              <pc:sldLayoutMk cId="0" sldId="2147483689"/>
-              <ac:spMk id="9" creationId="{518974DB-51D0-2C49-9088-48CE2D84AB1C}"/>
-            </ac:spMkLst>
-          </pc:spChg>
-          <pc:spChg chg="mod">
-            <ac:chgData name="Marcia Moraes" userId="c9c67e8a-58e2-4733-9a1c-5d44fec4775b" providerId="ADAL" clId="{83F1AA9E-2B53-413F-86E1-8572658E8DE4}" dt="2023-04-04T19:01:29.532" v="127" actId="20577"/>
-            <ac:spMkLst>
-              <pc:docMk/>
-              <pc:sldMasterMk cId="3965733437" sldId="2147483648"/>
-              <pc:sldLayoutMk cId="0" sldId="2147483689"/>
-              <ac:spMk id="11" creationId="{F621E987-BD36-AF48-B11C-CC4BAD65092F}"/>
-            </ac:spMkLst>
-          </pc:spChg>
-          <pc:picChg chg="mod">
-            <ac:chgData name="Marcia Moraes" userId="c9c67e8a-58e2-4733-9a1c-5d44fec4775b" providerId="ADAL" clId="{83F1AA9E-2B53-413F-86E1-8572658E8DE4}" dt="2023-04-04T19:00:47.513" v="7" actId="1076"/>
-            <ac:picMkLst>
-              <pc:docMk/>
-              <pc:sldMasterMk cId="3965733437" sldId="2147483648"/>
-              <pc:sldLayoutMk cId="0" sldId="2147483689"/>
-              <ac:picMk id="7" creationId="{00000000-0000-0000-0000-000000000000}"/>
-            </ac:picMkLst>
-          </pc:picChg>
-        </pc:sldLayoutChg>
-      </pc:sldMasterChg>
     </pc:docChg>
   </pc:docChgLst>
 </pc:chgInfo>
@@ -837,7 +281,7 @@
           <a:p>
             <a:fld id="{4D7E51A5-B478-1E40-8CBB-0DAA8831E99D}" type="datetimeFigureOut">
               <a:rPr lang="en-US" smtClean="0"/>
-              <a:t>4/4/2023</a:t>
+              <a:t>10/30/2023</a:t>
             </a:fld>
             <a:endParaRPr lang="en-US"/>
           </a:p>
@@ -1002,7 +446,7 @@
           <a:p>
             <a:fld id="{D0ED587F-861E-6740-9643-E3DDAE89B8D6}" type="datetimeFigureOut">
               <a:rPr lang="en-US" smtClean="0"/>
-              <a:t>4/4/2023</a:t>
+              <a:t>10/30/2023</a:t>
             </a:fld>
             <a:endParaRPr lang="en-US"/>
           </a:p>
@@ -11856,427 +11300,6 @@
       </p:sp>
       <p:sp>
         <p:nvSpPr>
-          <p:cNvPr id="5" name="TextBox 4">
-            <a:extLst>
-              <a:ext uri="{FF2B5EF4-FFF2-40B4-BE49-F238E27FC236}">
-                <a16:creationId xmlns:a16="http://schemas.microsoft.com/office/drawing/2014/main" id="{1E54CBCD-3447-4F03-970A-F1628F46BEF2}"/>
-              </a:ext>
-            </a:extLst>
-          </p:cNvPr>
-          <p:cNvSpPr txBox="1"/>
-          <p:nvPr/>
-        </p:nvSpPr>
-        <p:spPr>
-          <a:xfrm>
-            <a:off x="10348353" y="3780234"/>
-            <a:ext cx="3352800" cy="3477875"/>
-          </a:xfrm>
-          <a:prstGeom prst="rect">
-            <a:avLst/>
-          </a:prstGeom>
-          <a:solidFill>
-            <a:schemeClr val="bg2">
-              <a:lumMod val="40000"/>
-              <a:lumOff val="60000"/>
-            </a:schemeClr>
-          </a:solidFill>
-        </p:spPr>
-        <p:txBody>
-          <a:bodyPr wrap="square" rtlCol="0">
-            <a:spAutoFit/>
-          </a:bodyPr>
-          <a:lstStyle/>
-          <a:p>
-            <a:pPr marL="0" marR="0" lvl="0" indent="0" algn="l" defTabSz="509292" rtl="0" eaLnBrk="1" fontAlgn="auto" latinLnBrk="0" hangingPunct="1">
-              <a:lnSpc>
-                <a:spcPct val="100000"/>
-              </a:lnSpc>
-              <a:spcBef>
-                <a:spcPts val="0"/>
-              </a:spcBef>
-              <a:spcAft>
-                <a:spcPts val="0"/>
-              </a:spcAft>
-              <a:buClrTx/>
-              <a:buSzTx/>
-              <a:buFontTx/>
-              <a:buNone/>
-              <a:tabLst/>
-              <a:defRPr/>
-            </a:pPr>
-            <a:r>
-              <a:rPr kumimoji="0" lang="en-US" sz="2000" b="0" i="0" u="none" strike="noStrike" kern="1200" cap="none" spc="0" normalizeH="0" baseline="0" noProof="0" dirty="0">
-                <a:ln>
-                  <a:noFill/>
-                </a:ln>
-                <a:solidFill>
-                  <a:srgbClr val="000000"/>
-                </a:solidFill>
-                <a:effectLst/>
-                <a:uLnTx/>
-                <a:uFillTx/>
-                <a:latin typeface="Arial" panose="020B0604020202020204"/>
-                <a:ea typeface="+mn-ea"/>
-                <a:cs typeface="+mn-cs"/>
-              </a:rPr>
-              <a:t>Wednesday Help Desk – </a:t>
-            </a:r>
-          </a:p>
-          <a:p>
-            <a:pPr marL="0" marR="0" lvl="0" indent="0" algn="l" defTabSz="509292" rtl="0" eaLnBrk="1" fontAlgn="auto" latinLnBrk="0" hangingPunct="1">
-              <a:lnSpc>
-                <a:spcPct val="100000"/>
-              </a:lnSpc>
-              <a:spcBef>
-                <a:spcPts val="0"/>
-              </a:spcBef>
-              <a:spcAft>
-                <a:spcPts val="0"/>
-              </a:spcAft>
-              <a:buClrTx/>
-              <a:buSzTx/>
-              <a:buFontTx/>
-              <a:buNone/>
-              <a:tabLst/>
-              <a:defRPr/>
-            </a:pPr>
-            <a:r>
-              <a:rPr kumimoji="0" lang="en-US" sz="2000" b="0" i="0" u="none" strike="noStrike" kern="1200" cap="none" spc="0" normalizeH="0" baseline="0" noProof="0" dirty="0">
-                <a:ln>
-                  <a:noFill/>
-                </a:ln>
-                <a:solidFill>
-                  <a:srgbClr val="000000"/>
-                </a:solidFill>
-                <a:effectLst/>
-                <a:uLnTx/>
-                <a:uFillTx/>
-                <a:latin typeface="Arial" panose="020B0604020202020204"/>
-                <a:ea typeface="+mn-ea"/>
-                <a:cs typeface="+mn-cs"/>
-              </a:rPr>
-              <a:t>3-4pm CSB120</a:t>
-            </a:r>
-          </a:p>
-          <a:p>
-            <a:pPr marL="0" marR="0" lvl="0" indent="0" algn="l" defTabSz="509292" rtl="0" eaLnBrk="1" fontAlgn="auto" latinLnBrk="0" hangingPunct="1">
-              <a:lnSpc>
-                <a:spcPct val="100000"/>
-              </a:lnSpc>
-              <a:spcBef>
-                <a:spcPts val="0"/>
-              </a:spcBef>
-              <a:spcAft>
-                <a:spcPts val="0"/>
-              </a:spcAft>
-              <a:buClrTx/>
-              <a:buSzTx/>
-              <a:buFontTx/>
-              <a:buNone/>
-              <a:tabLst/>
-              <a:defRPr/>
-            </a:pPr>
-            <a:endParaRPr kumimoji="0" lang="en-US" sz="2000" b="0" i="0" u="none" strike="noStrike" kern="1200" cap="none" spc="0" normalizeH="0" baseline="0" noProof="0" dirty="0">
-              <a:ln>
-                <a:noFill/>
-              </a:ln>
-              <a:solidFill>
-                <a:srgbClr val="000000"/>
-              </a:solidFill>
-              <a:effectLst/>
-              <a:uLnTx/>
-              <a:uFillTx/>
-              <a:latin typeface="Arial" panose="020B0604020202020204"/>
-              <a:ea typeface="+mn-ea"/>
-              <a:cs typeface="+mn-cs"/>
-            </a:endParaRPr>
-          </a:p>
-          <a:p>
-            <a:pPr marL="0" marR="0" lvl="0" indent="0" algn="l" defTabSz="509292" rtl="0" eaLnBrk="1" fontAlgn="auto" latinLnBrk="0" hangingPunct="1">
-              <a:lnSpc>
-                <a:spcPct val="100000"/>
-              </a:lnSpc>
-              <a:spcBef>
-                <a:spcPts val="0"/>
-              </a:spcBef>
-              <a:spcAft>
-                <a:spcPts val="0"/>
-              </a:spcAft>
-              <a:buClrTx/>
-              <a:buSzTx/>
-              <a:buFontTx/>
-              <a:buNone/>
-              <a:tabLst/>
-              <a:defRPr/>
-            </a:pPr>
-            <a:r>
-              <a:rPr kumimoji="0" lang="en-US" sz="2000" b="0" i="0" u="none" strike="noStrike" kern="1200" cap="none" spc="0" normalizeH="0" baseline="0" noProof="0" dirty="0">
-                <a:ln>
-                  <a:noFill/>
-                </a:ln>
-                <a:solidFill>
-                  <a:srgbClr val="000000"/>
-                </a:solidFill>
-                <a:effectLst/>
-                <a:uLnTx/>
-                <a:uFillTx/>
-                <a:latin typeface="Arial" panose="020B0604020202020204"/>
-                <a:ea typeface="+mn-ea"/>
-                <a:cs typeface="+mn-cs"/>
-              </a:rPr>
-              <a:t>Wednesday Help Session – </a:t>
-            </a:r>
-          </a:p>
-          <a:p>
-            <a:pPr marL="0" marR="0" lvl="0" indent="0" algn="l" defTabSz="509292" rtl="0" eaLnBrk="1" fontAlgn="auto" latinLnBrk="0" hangingPunct="1">
-              <a:lnSpc>
-                <a:spcPct val="100000"/>
-              </a:lnSpc>
-              <a:spcBef>
-                <a:spcPts val="0"/>
-              </a:spcBef>
-              <a:spcAft>
-                <a:spcPts val="0"/>
-              </a:spcAft>
-              <a:buClrTx/>
-              <a:buSzTx/>
-              <a:buFontTx/>
-              <a:buNone/>
-              <a:tabLst/>
-              <a:defRPr/>
-            </a:pPr>
-            <a:r>
-              <a:rPr kumimoji="0" lang="en-US" sz="2000" b="0" i="0" u="none" strike="noStrike" kern="1200" cap="none" spc="0" normalizeH="0" baseline="0" noProof="0" dirty="0">
-                <a:ln>
-                  <a:noFill/>
-                </a:ln>
-                <a:solidFill>
-                  <a:srgbClr val="000000"/>
-                </a:solidFill>
-                <a:effectLst/>
-                <a:uLnTx/>
-                <a:uFillTx/>
-                <a:latin typeface="Arial" panose="020B0604020202020204"/>
-                <a:ea typeface="+mn-ea"/>
-                <a:cs typeface="+mn-cs"/>
-              </a:rPr>
-              <a:t>3-4pm CSB305</a:t>
-            </a:r>
-          </a:p>
-          <a:p>
-            <a:pPr marL="0" marR="0" lvl="0" indent="0" algn="l" defTabSz="509292" rtl="0" eaLnBrk="1" fontAlgn="auto" latinLnBrk="0" hangingPunct="1">
-              <a:lnSpc>
-                <a:spcPct val="100000"/>
-              </a:lnSpc>
-              <a:spcBef>
-                <a:spcPts val="0"/>
-              </a:spcBef>
-              <a:spcAft>
-                <a:spcPts val="0"/>
-              </a:spcAft>
-              <a:buClrTx/>
-              <a:buSzTx/>
-              <a:buFontTx/>
-              <a:buNone/>
-              <a:tabLst/>
-              <a:defRPr/>
-            </a:pPr>
-            <a:endParaRPr kumimoji="0" lang="en-US" sz="2000" b="0" i="0" u="none" strike="noStrike" kern="1200" cap="none" spc="0" normalizeH="0" baseline="0" noProof="0" dirty="0">
-              <a:ln>
-                <a:noFill/>
-              </a:ln>
-              <a:solidFill>
-                <a:srgbClr val="000000"/>
-              </a:solidFill>
-              <a:effectLst/>
-              <a:uLnTx/>
-              <a:uFillTx/>
-              <a:latin typeface="Arial" panose="020B0604020202020204"/>
-              <a:ea typeface="+mn-ea"/>
-              <a:cs typeface="+mn-cs"/>
-            </a:endParaRPr>
-          </a:p>
-          <a:p>
-            <a:pPr marL="0" marR="0" lvl="0" indent="0" algn="l" defTabSz="509292" rtl="0" eaLnBrk="1" fontAlgn="auto" latinLnBrk="0" hangingPunct="1">
-              <a:lnSpc>
-                <a:spcPct val="100000"/>
-              </a:lnSpc>
-              <a:spcBef>
-                <a:spcPts val="0"/>
-              </a:spcBef>
-              <a:spcAft>
-                <a:spcPts val="0"/>
-              </a:spcAft>
-              <a:buClrTx/>
-              <a:buSzTx/>
-              <a:buFontTx/>
-              <a:buNone/>
-              <a:tabLst/>
-              <a:defRPr/>
-            </a:pPr>
-            <a:r>
-              <a:rPr kumimoji="0" lang="en-US" sz="2000" b="0" i="0" u="none" strike="noStrike" kern="1200" cap="none" spc="0" normalizeH="0" baseline="0" noProof="0" dirty="0">
-                <a:ln>
-                  <a:noFill/>
-                </a:ln>
-                <a:solidFill>
-                  <a:srgbClr val="000000"/>
-                </a:solidFill>
-                <a:effectLst/>
-                <a:uLnTx/>
-                <a:uFillTx/>
-                <a:latin typeface="Arial" panose="020B0604020202020204"/>
-                <a:ea typeface="+mn-ea"/>
-                <a:cs typeface="+mn-cs"/>
-              </a:rPr>
-              <a:t>Thursday Help Desk – </a:t>
-            </a:r>
-          </a:p>
-          <a:p>
-            <a:pPr marL="0" marR="0" lvl="0" indent="0" algn="l" defTabSz="509292" rtl="0" eaLnBrk="1" fontAlgn="auto" latinLnBrk="0" hangingPunct="1">
-              <a:lnSpc>
-                <a:spcPct val="100000"/>
-              </a:lnSpc>
-              <a:spcBef>
-                <a:spcPts val="0"/>
-              </a:spcBef>
-              <a:spcAft>
-                <a:spcPts val="0"/>
-              </a:spcAft>
-              <a:buClrTx/>
-              <a:buSzTx/>
-              <a:buFontTx/>
-              <a:buNone/>
-              <a:tabLst/>
-              <a:defRPr/>
-            </a:pPr>
-            <a:r>
-              <a:rPr kumimoji="0" lang="en-US" sz="2000" b="0" i="0" u="none" strike="noStrike" kern="1200" cap="none" spc="0" normalizeH="0" baseline="0" noProof="0" dirty="0">
-                <a:ln>
-                  <a:noFill/>
-                </a:ln>
-                <a:solidFill>
-                  <a:srgbClr val="000000"/>
-                </a:solidFill>
-                <a:effectLst/>
-                <a:uLnTx/>
-                <a:uFillTx/>
-                <a:latin typeface="Arial" panose="020B0604020202020204"/>
-                <a:ea typeface="+mn-ea"/>
-                <a:cs typeface="+mn-cs"/>
-              </a:rPr>
-              <a:t>6-8pm Teams</a:t>
-            </a:r>
-          </a:p>
-          <a:p>
-            <a:pPr marL="0" marR="0" lvl="0" indent="0" algn="l" defTabSz="509292" rtl="0" eaLnBrk="1" fontAlgn="auto" latinLnBrk="0" hangingPunct="1">
-              <a:lnSpc>
-                <a:spcPct val="100000"/>
-              </a:lnSpc>
-              <a:spcBef>
-                <a:spcPts val="0"/>
-              </a:spcBef>
-              <a:spcAft>
-                <a:spcPts val="0"/>
-              </a:spcAft>
-              <a:buClrTx/>
-              <a:buSzTx/>
-              <a:buFontTx/>
-              <a:buNone/>
-              <a:tabLst/>
-              <a:defRPr/>
-            </a:pPr>
-            <a:endParaRPr kumimoji="0" lang="en-US" sz="2000" b="0" i="0" u="none" strike="noStrike" kern="1200" cap="none" spc="0" normalizeH="0" baseline="0" noProof="0" dirty="0">
-              <a:ln>
-                <a:noFill/>
-              </a:ln>
-              <a:solidFill>
-                <a:srgbClr val="000000"/>
-              </a:solidFill>
-              <a:effectLst/>
-              <a:uLnTx/>
-              <a:uFillTx/>
-              <a:latin typeface="Arial" panose="020B0604020202020204"/>
-              <a:ea typeface="+mn-ea"/>
-              <a:cs typeface="+mn-cs"/>
-            </a:endParaRPr>
-          </a:p>
-          <a:p>
-            <a:pPr marL="0" marR="0" lvl="0" indent="0" algn="l" defTabSz="509292" rtl="0" eaLnBrk="1" fontAlgn="auto" latinLnBrk="0" hangingPunct="1">
-              <a:lnSpc>
-                <a:spcPct val="100000"/>
-              </a:lnSpc>
-              <a:spcBef>
-                <a:spcPts val="0"/>
-              </a:spcBef>
-              <a:spcAft>
-                <a:spcPts val="0"/>
-              </a:spcAft>
-              <a:buClrTx/>
-              <a:buSzTx/>
-              <a:buFontTx/>
-              <a:buNone/>
-              <a:tabLst/>
-              <a:defRPr/>
-            </a:pPr>
-            <a:r>
-              <a:rPr kumimoji="0" lang="en-US" sz="2000" b="0" i="0" u="none" strike="noStrike" kern="1200" cap="none" spc="0" normalizeH="0" baseline="0" noProof="0" dirty="0">
-                <a:ln>
-                  <a:noFill/>
-                </a:ln>
-                <a:solidFill>
-                  <a:srgbClr val="000000"/>
-                </a:solidFill>
-                <a:effectLst/>
-                <a:uLnTx/>
-                <a:uFillTx/>
-                <a:latin typeface="Arial" panose="020B0604020202020204"/>
-                <a:ea typeface="+mn-ea"/>
-                <a:cs typeface="+mn-cs"/>
-              </a:rPr>
-              <a:t>Thursday Help Session –</a:t>
-            </a:r>
-          </a:p>
-          <a:p>
-            <a:pPr marL="0" marR="0" lvl="0" indent="0" algn="l" defTabSz="509292" rtl="0" eaLnBrk="1" fontAlgn="auto" latinLnBrk="0" hangingPunct="1">
-              <a:lnSpc>
-                <a:spcPct val="100000"/>
-              </a:lnSpc>
-              <a:spcBef>
-                <a:spcPts val="0"/>
-              </a:spcBef>
-              <a:spcAft>
-                <a:spcPts val="0"/>
-              </a:spcAft>
-              <a:buClrTx/>
-              <a:buSzTx/>
-              <a:buFontTx/>
-              <a:buNone/>
-              <a:tabLst/>
-              <a:defRPr/>
-            </a:pPr>
-            <a:r>
-              <a:rPr kumimoji="0" lang="en-US" sz="2000" b="0" i="0" u="none" strike="noStrike" kern="1200" cap="none" spc="0" normalizeH="0" baseline="0" noProof="0" dirty="0">
-                <a:ln>
-                  <a:noFill/>
-                </a:ln>
-                <a:solidFill>
-                  <a:srgbClr val="000000"/>
-                </a:solidFill>
-                <a:effectLst/>
-                <a:uLnTx/>
-                <a:uFillTx/>
-                <a:latin typeface="Arial" panose="020B0604020202020204"/>
-                <a:ea typeface="+mn-ea"/>
-                <a:cs typeface="+mn-cs"/>
-              </a:rPr>
-              <a:t>3:30-4:30pm Teams </a:t>
-            </a:r>
-          </a:p>
-        </p:txBody>
-      </p:sp>
-      <p:sp>
-        <p:nvSpPr>
           <p:cNvPr id="7" name="TextBox 6">
             <a:extLst>
               <a:ext uri="{FF2B5EF4-FFF2-40B4-BE49-F238E27FC236}">
@@ -12290,7 +11313,7 @@
         <p:spPr>
           <a:xfrm>
             <a:off x="363024" y="999495"/>
-            <a:ext cx="9771576" cy="4893647"/>
+            <a:ext cx="9771576" cy="4493538"/>
           </a:xfrm>
           <a:prstGeom prst="rect">
             <a:avLst/>
@@ -12643,45 +11666,6 @@
               <a:cs typeface="Arial"/>
               <a:sym typeface="Arial"/>
             </a:endParaRPr>
-          </a:p>
-          <a:p>
-            <a:pPr marL="431797" marR="0" lvl="0" indent="-431797" algn="l" defTabSz="1381750" rtl="0" eaLnBrk="1" fontAlgn="auto" latinLnBrk="0" hangingPunct="1">
-              <a:lnSpc>
-                <a:spcPct val="100000"/>
-              </a:lnSpc>
-              <a:spcBef>
-                <a:spcPts val="0"/>
-              </a:spcBef>
-              <a:spcAft>
-                <a:spcPts val="0"/>
-              </a:spcAft>
-              <a:buClr>
-                <a:srgbClr val="000000"/>
-              </a:buClr>
-              <a:buSzTx/>
-              <a:buFont typeface="Arial" panose="020B0604020202020204" pitchFamily="34" charset="0"/>
-              <a:buChar char="•"/>
-              <a:tabLst/>
-              <a:defRPr/>
-            </a:pPr>
-            <a:r>
-              <a:rPr kumimoji="0" lang="en-US" sz="2600" b="0" i="0" u="none" strike="noStrike" kern="0" cap="none" spc="0" normalizeH="0" baseline="0" noProof="0" dirty="0">
-                <a:ln>
-                  <a:noFill/>
-                </a:ln>
-                <a:solidFill>
-                  <a:srgbClr val="000000"/>
-                </a:solidFill>
-                <a:effectLst/>
-                <a:uLnTx/>
-                <a:uFillTx/>
-                <a:latin typeface="Arial"/>
-                <a:ea typeface="+mn-ea"/>
-                <a:cs typeface="Arial"/>
-                <a:sym typeface="Arial"/>
-              </a:rPr>
-              <a:t>Lab 16</a:t>
-            </a:r>
           </a:p>
           <a:p>
             <a:pPr marL="431797" marR="0" lvl="0" indent="-431797" algn="l" defTabSz="1381750" rtl="0" eaLnBrk="1" fontAlgn="auto" latinLnBrk="0" hangingPunct="1">
@@ -12964,6 +11948,1439 @@
           </a:extLst>
         </p:spPr>
       </p:pic>
+      <p:sp>
+        <p:nvSpPr>
+          <p:cNvPr id="10" name="TextBox 9">
+            <a:extLst>
+              <a:ext uri="{FF2B5EF4-FFF2-40B4-BE49-F238E27FC236}">
+                <a16:creationId xmlns:a16="http://schemas.microsoft.com/office/drawing/2014/main" id="{66555DE1-A8B6-487A-A5B5-393C7779DC95}"/>
+              </a:ext>
+            </a:extLst>
+          </p:cNvPr>
+          <p:cNvSpPr txBox="1"/>
+          <p:nvPr/>
+        </p:nvSpPr>
+        <p:spPr>
+          <a:xfrm flipH="1">
+            <a:off x="9942181" y="3648975"/>
+            <a:ext cx="2444933" cy="400110"/>
+          </a:xfrm>
+          <a:prstGeom prst="rect">
+            <a:avLst/>
+          </a:prstGeom>
+          <a:noFill/>
+        </p:spPr>
+        <p:txBody>
+          <a:bodyPr wrap="square" rtlCol="0">
+            <a:spAutoFit/>
+          </a:bodyPr>
+          <a:lstStyle/>
+          <a:p>
+            <a:r>
+              <a:rPr lang="en-US" dirty="0"/>
+              <a:t>Help Desk</a:t>
+            </a:r>
+          </a:p>
+        </p:txBody>
+      </p:sp>
+      <p:graphicFrame>
+        <p:nvGraphicFramePr>
+          <p:cNvPr id="11" name="Table 10">
+            <a:extLst>
+              <a:ext uri="{FF2B5EF4-FFF2-40B4-BE49-F238E27FC236}">
+                <a16:creationId xmlns:a16="http://schemas.microsoft.com/office/drawing/2014/main" id="{921825B0-08B4-4D5E-BD7F-5A0D8BA13775}"/>
+              </a:ext>
+            </a:extLst>
+          </p:cNvPr>
+          <p:cNvGraphicFramePr>
+            <a:graphicFrameLocks noGrp="1"/>
+          </p:cNvGraphicFramePr>
+          <p:nvPr>
+            <p:extLst>
+              <p:ext uri="{D42A27DB-BD31-4B8C-83A1-F6EECF244321}">
+                <p14:modId xmlns:p14="http://schemas.microsoft.com/office/powerpoint/2010/main" val="3042304119"/>
+              </p:ext>
+            </p:extLst>
+          </p:nvPr>
+        </p:nvGraphicFramePr>
+        <p:xfrm>
+          <a:off x="9987253" y="4063757"/>
+          <a:ext cx="3572199" cy="3253859"/>
+        </p:xfrm>
+        <a:graphic>
+          <a:graphicData uri="http://schemas.openxmlformats.org/drawingml/2006/table">
+            <a:tbl>
+              <a:tblPr firstRow="1">
+                <a:tableStyleId>{5C22544A-7EE6-4342-B048-85BDC9FD1C3A}</a:tableStyleId>
+              </a:tblPr>
+              <a:tblGrid>
+                <a:gridCol w="1105468">
+                  <a:extLst>
+                    <a:ext uri="{9D8B030D-6E8A-4147-A177-3AD203B41FA5}">
+                      <a16:colId xmlns:a16="http://schemas.microsoft.com/office/drawing/2014/main" val="1333462331"/>
+                    </a:ext>
+                  </a:extLst>
+                </a:gridCol>
+                <a:gridCol w="2466731">
+                  <a:extLst>
+                    <a:ext uri="{9D8B030D-6E8A-4147-A177-3AD203B41FA5}">
+                      <a16:colId xmlns:a16="http://schemas.microsoft.com/office/drawing/2014/main" val="668155110"/>
+                    </a:ext>
+                  </a:extLst>
+                </a:gridCol>
+              </a:tblGrid>
+              <a:tr h="165373">
+                <a:tc>
+                  <a:txBody>
+                    <a:bodyPr/>
+                    <a:lstStyle/>
+                    <a:p>
+                      <a:pPr marL="0" marR="0">
+                        <a:lnSpc>
+                          <a:spcPct val="107000"/>
+                        </a:lnSpc>
+                        <a:spcBef>
+                          <a:spcPts val="0"/>
+                        </a:spcBef>
+                        <a:spcAft>
+                          <a:spcPts val="800"/>
+                        </a:spcAft>
+                      </a:pPr>
+                      <a:r>
+                        <a:rPr lang="en-US" sz="1600" dirty="0">
+                          <a:solidFill>
+                            <a:schemeClr val="tx1"/>
+                          </a:solidFill>
+                          <a:effectLst/>
+                        </a:rPr>
+                        <a:t>Day</a:t>
+                      </a:r>
+                      <a:endParaRPr lang="en-US" sz="1600" dirty="0">
+                        <a:solidFill>
+                          <a:schemeClr val="tx1"/>
+                        </a:solidFill>
+                        <a:effectLst/>
+                        <a:latin typeface="Calibri" panose="020F0502020204030204" pitchFamily="34" charset="0"/>
+                        <a:ea typeface="Calibri" panose="020F0502020204030204" pitchFamily="34" charset="0"/>
+                        <a:cs typeface="Times New Roman" panose="02020603050405020304" pitchFamily="18" charset="0"/>
+                      </a:endParaRPr>
+                    </a:p>
+                  </a:txBody>
+                  <a:tcPr marL="15875" marR="15875" marT="15875" marB="15875" anchor="ctr">
+                    <a:lnL w="12700" cap="flat" cmpd="sng" algn="ctr">
+                      <a:solidFill>
+                        <a:schemeClr val="tx1"/>
+                      </a:solidFill>
+                      <a:prstDash val="solid"/>
+                      <a:round/>
+                      <a:headEnd type="none" w="med" len="med"/>
+                      <a:tailEnd type="none" w="med" len="med"/>
+                    </a:lnL>
+                    <a:lnR w="12700" cap="flat" cmpd="sng" algn="ctr">
+                      <a:solidFill>
+                        <a:schemeClr val="tx1"/>
+                      </a:solidFill>
+                      <a:prstDash val="solid"/>
+                      <a:round/>
+                      <a:headEnd type="none" w="med" len="med"/>
+                      <a:tailEnd type="none" w="med" len="med"/>
+                    </a:lnR>
+                    <a:lnT w="12700" cap="flat" cmpd="sng" algn="ctr">
+                      <a:solidFill>
+                        <a:schemeClr val="tx1"/>
+                      </a:solidFill>
+                      <a:prstDash val="solid"/>
+                      <a:round/>
+                      <a:headEnd type="none" w="med" len="med"/>
+                      <a:tailEnd type="none" w="med" len="med"/>
+                    </a:lnT>
+                    <a:lnB w="12700" cap="flat" cmpd="sng" algn="ctr">
+                      <a:solidFill>
+                        <a:schemeClr val="tx1"/>
+                      </a:solidFill>
+                      <a:prstDash val="solid"/>
+                      <a:round/>
+                      <a:headEnd type="none" w="med" len="med"/>
+                      <a:tailEnd type="none" w="med" len="med"/>
+                    </a:lnB>
+                    <a:lnTlToBr w="12700" cmpd="sng">
+                      <a:noFill/>
+                      <a:prstDash val="solid"/>
+                    </a:lnTlToBr>
+                    <a:lnBlToTr w="12700" cmpd="sng">
+                      <a:noFill/>
+                      <a:prstDash val="solid"/>
+                    </a:lnBlToTr>
+                    <a:solidFill>
+                      <a:schemeClr val="bg1"/>
+                    </a:solidFill>
+                  </a:tcPr>
+                </a:tc>
+                <a:tc>
+                  <a:txBody>
+                    <a:bodyPr/>
+                    <a:lstStyle/>
+                    <a:p>
+                      <a:pPr marL="0" marR="0">
+                        <a:lnSpc>
+                          <a:spcPct val="107000"/>
+                        </a:lnSpc>
+                        <a:spcBef>
+                          <a:spcPts val="0"/>
+                        </a:spcBef>
+                        <a:spcAft>
+                          <a:spcPts val="800"/>
+                        </a:spcAft>
+                      </a:pPr>
+                      <a:r>
+                        <a:rPr lang="en-US" sz="1600" dirty="0">
+                          <a:solidFill>
+                            <a:schemeClr val="tx1"/>
+                          </a:solidFill>
+                          <a:effectLst/>
+                        </a:rPr>
+                        <a:t>Time : Room</a:t>
+                      </a:r>
+                      <a:endParaRPr lang="en-US" sz="1600" dirty="0">
+                        <a:solidFill>
+                          <a:schemeClr val="tx1"/>
+                        </a:solidFill>
+                        <a:effectLst/>
+                        <a:latin typeface="Calibri" panose="020F0502020204030204" pitchFamily="34" charset="0"/>
+                        <a:ea typeface="Calibri" panose="020F0502020204030204" pitchFamily="34" charset="0"/>
+                        <a:cs typeface="Times New Roman" panose="02020603050405020304" pitchFamily="18" charset="0"/>
+                      </a:endParaRPr>
+                    </a:p>
+                  </a:txBody>
+                  <a:tcPr marL="15875" marR="15875" marT="15875" marB="15875" anchor="ctr">
+                    <a:lnL w="12700" cap="flat" cmpd="sng" algn="ctr">
+                      <a:solidFill>
+                        <a:schemeClr val="tx1"/>
+                      </a:solidFill>
+                      <a:prstDash val="solid"/>
+                      <a:round/>
+                      <a:headEnd type="none" w="med" len="med"/>
+                      <a:tailEnd type="none" w="med" len="med"/>
+                    </a:lnL>
+                    <a:lnR w="12700" cap="flat" cmpd="sng" algn="ctr">
+                      <a:solidFill>
+                        <a:schemeClr val="tx1"/>
+                      </a:solidFill>
+                      <a:prstDash val="solid"/>
+                      <a:round/>
+                      <a:headEnd type="none" w="med" len="med"/>
+                      <a:tailEnd type="none" w="med" len="med"/>
+                    </a:lnR>
+                    <a:lnT w="12700" cap="flat" cmpd="sng" algn="ctr">
+                      <a:solidFill>
+                        <a:schemeClr val="tx1"/>
+                      </a:solidFill>
+                      <a:prstDash val="solid"/>
+                      <a:round/>
+                      <a:headEnd type="none" w="med" len="med"/>
+                      <a:tailEnd type="none" w="med" len="med"/>
+                    </a:lnT>
+                    <a:lnB w="12700" cap="flat" cmpd="sng" algn="ctr">
+                      <a:solidFill>
+                        <a:schemeClr val="tx1"/>
+                      </a:solidFill>
+                      <a:prstDash val="solid"/>
+                      <a:round/>
+                      <a:headEnd type="none" w="med" len="med"/>
+                      <a:tailEnd type="none" w="med" len="med"/>
+                    </a:lnB>
+                    <a:lnTlToBr w="12700" cmpd="sng">
+                      <a:noFill/>
+                      <a:prstDash val="solid"/>
+                    </a:lnTlToBr>
+                    <a:lnBlToTr w="12700" cmpd="sng">
+                      <a:noFill/>
+                      <a:prstDash val="solid"/>
+                    </a:lnBlToTr>
+                    <a:solidFill>
+                      <a:schemeClr val="bg1"/>
+                    </a:solidFill>
+                  </a:tcPr>
+                </a:tc>
+                <a:extLst>
+                  <a:ext uri="{0D108BD9-81ED-4DB2-BD59-A6C34878D82A}">
+                    <a16:rowId xmlns:a16="http://schemas.microsoft.com/office/drawing/2014/main" val="3093163206"/>
+                  </a:ext>
+                </a:extLst>
+              </a:tr>
+              <a:tr h="581669">
+                <a:tc>
+                  <a:txBody>
+                    <a:bodyPr/>
+                    <a:lstStyle/>
+                    <a:p>
+                      <a:pPr marL="0" marR="0">
+                        <a:lnSpc>
+                          <a:spcPct val="107000"/>
+                        </a:lnSpc>
+                        <a:spcBef>
+                          <a:spcPts val="0"/>
+                        </a:spcBef>
+                        <a:spcAft>
+                          <a:spcPts val="800"/>
+                        </a:spcAft>
+                      </a:pPr>
+                      <a:r>
+                        <a:rPr lang="en-US" sz="1600" dirty="0">
+                          <a:effectLst/>
+                        </a:rPr>
+                        <a:t>Monday</a:t>
+                      </a:r>
+                      <a:endParaRPr lang="en-US" sz="1600" dirty="0">
+                        <a:effectLst/>
+                        <a:latin typeface="Calibri" panose="020F0502020204030204" pitchFamily="34" charset="0"/>
+                        <a:ea typeface="Calibri" panose="020F0502020204030204" pitchFamily="34" charset="0"/>
+                        <a:cs typeface="Times New Roman" panose="02020603050405020304" pitchFamily="18" charset="0"/>
+                      </a:endParaRPr>
+                    </a:p>
+                  </a:txBody>
+                  <a:tcPr marL="15875" marR="15875" marT="15875" marB="15875" anchor="ctr">
+                    <a:lnL w="12700" cap="flat" cmpd="sng" algn="ctr">
+                      <a:solidFill>
+                        <a:schemeClr val="tx1"/>
+                      </a:solidFill>
+                      <a:prstDash val="solid"/>
+                      <a:round/>
+                      <a:headEnd type="none" w="med" len="med"/>
+                      <a:tailEnd type="none" w="med" len="med"/>
+                    </a:lnL>
+                    <a:lnR w="12700" cap="flat" cmpd="sng" algn="ctr">
+                      <a:solidFill>
+                        <a:schemeClr val="tx1"/>
+                      </a:solidFill>
+                      <a:prstDash val="solid"/>
+                      <a:round/>
+                      <a:headEnd type="none" w="med" len="med"/>
+                      <a:tailEnd type="none" w="med" len="med"/>
+                    </a:lnR>
+                    <a:lnT w="12700" cap="flat" cmpd="sng" algn="ctr">
+                      <a:solidFill>
+                        <a:schemeClr val="tx1"/>
+                      </a:solidFill>
+                      <a:prstDash val="solid"/>
+                      <a:round/>
+                      <a:headEnd type="none" w="med" len="med"/>
+                      <a:tailEnd type="none" w="med" len="med"/>
+                    </a:lnT>
+                    <a:lnB w="12700" cap="flat" cmpd="sng" algn="ctr">
+                      <a:solidFill>
+                        <a:schemeClr val="tx1"/>
+                      </a:solidFill>
+                      <a:prstDash val="solid"/>
+                      <a:round/>
+                      <a:headEnd type="none" w="med" len="med"/>
+                      <a:tailEnd type="none" w="med" len="med"/>
+                    </a:lnB>
+                    <a:lnTlToBr w="12700" cmpd="sng">
+                      <a:noFill/>
+                      <a:prstDash val="solid"/>
+                    </a:lnTlToBr>
+                    <a:lnBlToTr w="12700" cmpd="sng">
+                      <a:noFill/>
+                      <a:prstDash val="solid"/>
+                    </a:lnBlToTr>
+                    <a:solidFill>
+                      <a:schemeClr val="bg1"/>
+                    </a:solidFill>
+                  </a:tcPr>
+                </a:tc>
+                <a:tc>
+                  <a:txBody>
+                    <a:bodyPr/>
+                    <a:lstStyle/>
+                    <a:p>
+                      <a:pPr marL="0" marR="0">
+                        <a:lnSpc>
+                          <a:spcPct val="107000"/>
+                        </a:lnSpc>
+                        <a:spcBef>
+                          <a:spcPts val="0"/>
+                        </a:spcBef>
+                        <a:spcAft>
+                          <a:spcPts val="800"/>
+                        </a:spcAft>
+                      </a:pPr>
+                      <a:r>
+                        <a:rPr lang="en-US" sz="1600" dirty="0">
+                          <a:effectLst/>
+                        </a:rPr>
+                        <a:t>12 PM - 2 PM : CSB 120</a:t>
+                      </a:r>
+                      <a:endParaRPr lang="en-US" sz="1600" dirty="0">
+                        <a:effectLst/>
+                        <a:latin typeface="Calibri" panose="020F0502020204030204" pitchFamily="34" charset="0"/>
+                        <a:ea typeface="Calibri" panose="020F0502020204030204" pitchFamily="34" charset="0"/>
+                        <a:cs typeface="Times New Roman" panose="02020603050405020304" pitchFamily="18" charset="0"/>
+                      </a:endParaRPr>
+                    </a:p>
+                  </a:txBody>
+                  <a:tcPr marL="15875" marR="15875" marT="15875" marB="15875" anchor="ctr">
+                    <a:lnL w="12700" cap="flat" cmpd="sng" algn="ctr">
+                      <a:solidFill>
+                        <a:schemeClr val="tx1"/>
+                      </a:solidFill>
+                      <a:prstDash val="solid"/>
+                      <a:round/>
+                      <a:headEnd type="none" w="med" len="med"/>
+                      <a:tailEnd type="none" w="med" len="med"/>
+                    </a:lnL>
+                    <a:lnR w="12700" cap="flat" cmpd="sng" algn="ctr">
+                      <a:solidFill>
+                        <a:schemeClr val="tx1"/>
+                      </a:solidFill>
+                      <a:prstDash val="solid"/>
+                      <a:round/>
+                      <a:headEnd type="none" w="med" len="med"/>
+                      <a:tailEnd type="none" w="med" len="med"/>
+                    </a:lnR>
+                    <a:lnT w="12700" cap="flat" cmpd="sng" algn="ctr">
+                      <a:solidFill>
+                        <a:schemeClr val="tx1"/>
+                      </a:solidFill>
+                      <a:prstDash val="solid"/>
+                      <a:round/>
+                      <a:headEnd type="none" w="med" len="med"/>
+                      <a:tailEnd type="none" w="med" len="med"/>
+                    </a:lnT>
+                    <a:lnB w="12700" cap="flat" cmpd="sng" algn="ctr">
+                      <a:solidFill>
+                        <a:schemeClr val="tx1"/>
+                      </a:solidFill>
+                      <a:prstDash val="solid"/>
+                      <a:round/>
+                      <a:headEnd type="none" w="med" len="med"/>
+                      <a:tailEnd type="none" w="med" len="med"/>
+                    </a:lnB>
+                    <a:lnTlToBr w="12700" cmpd="sng">
+                      <a:noFill/>
+                      <a:prstDash val="solid"/>
+                    </a:lnTlToBr>
+                    <a:lnBlToTr w="12700" cmpd="sng">
+                      <a:noFill/>
+                      <a:prstDash val="solid"/>
+                    </a:lnBlToTr>
+                    <a:solidFill>
+                      <a:schemeClr val="bg1"/>
+                    </a:solidFill>
+                  </a:tcPr>
+                </a:tc>
+                <a:extLst>
+                  <a:ext uri="{0D108BD9-81ED-4DB2-BD59-A6C34878D82A}">
+                    <a16:rowId xmlns:a16="http://schemas.microsoft.com/office/drawing/2014/main" val="1139786997"/>
+                  </a:ext>
+                </a:extLst>
+              </a:tr>
+              <a:tr h="307347">
+                <a:tc>
+                  <a:txBody>
+                    <a:bodyPr/>
+                    <a:lstStyle/>
+                    <a:p>
+                      <a:pPr marL="0" marR="0">
+                        <a:lnSpc>
+                          <a:spcPct val="107000"/>
+                        </a:lnSpc>
+                        <a:spcBef>
+                          <a:spcPts val="0"/>
+                        </a:spcBef>
+                        <a:spcAft>
+                          <a:spcPts val="800"/>
+                        </a:spcAft>
+                      </a:pPr>
+                      <a:r>
+                        <a:rPr lang="en-US" sz="1600">
+                          <a:effectLst/>
+                        </a:rPr>
+                        <a:t>Tuesday</a:t>
+                      </a:r>
+                      <a:endParaRPr lang="en-US" sz="1600">
+                        <a:effectLst/>
+                        <a:latin typeface="Calibri" panose="020F0502020204030204" pitchFamily="34" charset="0"/>
+                        <a:ea typeface="Calibri" panose="020F0502020204030204" pitchFamily="34" charset="0"/>
+                        <a:cs typeface="Times New Roman" panose="02020603050405020304" pitchFamily="18" charset="0"/>
+                      </a:endParaRPr>
+                    </a:p>
+                  </a:txBody>
+                  <a:tcPr marL="15875" marR="15875" marT="15875" marB="15875" anchor="ctr">
+                    <a:lnL w="12700" cap="flat" cmpd="sng" algn="ctr">
+                      <a:solidFill>
+                        <a:schemeClr val="tx1"/>
+                      </a:solidFill>
+                      <a:prstDash val="solid"/>
+                      <a:round/>
+                      <a:headEnd type="none" w="med" len="med"/>
+                      <a:tailEnd type="none" w="med" len="med"/>
+                    </a:lnL>
+                    <a:lnR w="12700" cap="flat" cmpd="sng" algn="ctr">
+                      <a:solidFill>
+                        <a:schemeClr val="tx1"/>
+                      </a:solidFill>
+                      <a:prstDash val="solid"/>
+                      <a:round/>
+                      <a:headEnd type="none" w="med" len="med"/>
+                      <a:tailEnd type="none" w="med" len="med"/>
+                    </a:lnR>
+                    <a:lnT w="12700" cap="flat" cmpd="sng" algn="ctr">
+                      <a:solidFill>
+                        <a:schemeClr val="tx1"/>
+                      </a:solidFill>
+                      <a:prstDash val="solid"/>
+                      <a:round/>
+                      <a:headEnd type="none" w="med" len="med"/>
+                      <a:tailEnd type="none" w="med" len="med"/>
+                    </a:lnT>
+                    <a:lnB w="12700" cap="flat" cmpd="sng" algn="ctr">
+                      <a:solidFill>
+                        <a:schemeClr val="tx1"/>
+                      </a:solidFill>
+                      <a:prstDash val="solid"/>
+                      <a:round/>
+                      <a:headEnd type="none" w="med" len="med"/>
+                      <a:tailEnd type="none" w="med" len="med"/>
+                    </a:lnB>
+                    <a:lnTlToBr w="12700" cmpd="sng">
+                      <a:noFill/>
+                      <a:prstDash val="solid"/>
+                    </a:lnTlToBr>
+                    <a:lnBlToTr w="12700" cmpd="sng">
+                      <a:noFill/>
+                      <a:prstDash val="solid"/>
+                    </a:lnBlToTr>
+                    <a:solidFill>
+                      <a:schemeClr val="bg1"/>
+                    </a:solidFill>
+                  </a:tcPr>
+                </a:tc>
+                <a:tc>
+                  <a:txBody>
+                    <a:bodyPr/>
+                    <a:lstStyle/>
+                    <a:p>
+                      <a:pPr marL="0" marR="0">
+                        <a:lnSpc>
+                          <a:spcPct val="107000"/>
+                        </a:lnSpc>
+                        <a:spcBef>
+                          <a:spcPts val="0"/>
+                        </a:spcBef>
+                        <a:spcAft>
+                          <a:spcPts val="800"/>
+                        </a:spcAft>
+                      </a:pPr>
+                      <a:r>
+                        <a:rPr lang="en-US" sz="1600">
+                          <a:effectLst/>
+                        </a:rPr>
+                        <a:t>6 PM - 8 PM : Teams</a:t>
+                      </a:r>
+                      <a:endParaRPr lang="en-US" sz="1600">
+                        <a:effectLst/>
+                        <a:latin typeface="Calibri" panose="020F0502020204030204" pitchFamily="34" charset="0"/>
+                        <a:ea typeface="Calibri" panose="020F0502020204030204" pitchFamily="34" charset="0"/>
+                        <a:cs typeface="Times New Roman" panose="02020603050405020304" pitchFamily="18" charset="0"/>
+                      </a:endParaRPr>
+                    </a:p>
+                  </a:txBody>
+                  <a:tcPr marL="15875" marR="15875" marT="15875" marB="15875" anchor="ctr">
+                    <a:lnL w="12700" cap="flat" cmpd="sng" algn="ctr">
+                      <a:solidFill>
+                        <a:schemeClr val="tx1"/>
+                      </a:solidFill>
+                      <a:prstDash val="solid"/>
+                      <a:round/>
+                      <a:headEnd type="none" w="med" len="med"/>
+                      <a:tailEnd type="none" w="med" len="med"/>
+                    </a:lnL>
+                    <a:lnR w="12700" cap="flat" cmpd="sng" algn="ctr">
+                      <a:solidFill>
+                        <a:schemeClr val="tx1"/>
+                      </a:solidFill>
+                      <a:prstDash val="solid"/>
+                      <a:round/>
+                      <a:headEnd type="none" w="med" len="med"/>
+                      <a:tailEnd type="none" w="med" len="med"/>
+                    </a:lnR>
+                    <a:lnT w="12700" cap="flat" cmpd="sng" algn="ctr">
+                      <a:solidFill>
+                        <a:schemeClr val="tx1"/>
+                      </a:solidFill>
+                      <a:prstDash val="solid"/>
+                      <a:round/>
+                      <a:headEnd type="none" w="med" len="med"/>
+                      <a:tailEnd type="none" w="med" len="med"/>
+                    </a:lnT>
+                    <a:lnB w="12700" cap="flat" cmpd="sng" algn="ctr">
+                      <a:solidFill>
+                        <a:schemeClr val="tx1"/>
+                      </a:solidFill>
+                      <a:prstDash val="solid"/>
+                      <a:round/>
+                      <a:headEnd type="none" w="med" len="med"/>
+                      <a:tailEnd type="none" w="med" len="med"/>
+                    </a:lnB>
+                    <a:lnTlToBr w="12700" cmpd="sng">
+                      <a:noFill/>
+                      <a:prstDash val="solid"/>
+                    </a:lnTlToBr>
+                    <a:lnBlToTr w="12700" cmpd="sng">
+                      <a:noFill/>
+                      <a:prstDash val="solid"/>
+                    </a:lnBlToTr>
+                    <a:solidFill>
+                      <a:schemeClr val="bg1"/>
+                    </a:solidFill>
+                  </a:tcPr>
+                </a:tc>
+                <a:extLst>
+                  <a:ext uri="{0D108BD9-81ED-4DB2-BD59-A6C34878D82A}">
+                    <a16:rowId xmlns:a16="http://schemas.microsoft.com/office/drawing/2014/main" val="1164388044"/>
+                  </a:ext>
+                </a:extLst>
+              </a:tr>
+              <a:tr h="581669">
+                <a:tc>
+                  <a:txBody>
+                    <a:bodyPr/>
+                    <a:lstStyle/>
+                    <a:p>
+                      <a:pPr marL="0" marR="0">
+                        <a:lnSpc>
+                          <a:spcPct val="107000"/>
+                        </a:lnSpc>
+                        <a:spcBef>
+                          <a:spcPts val="0"/>
+                        </a:spcBef>
+                        <a:spcAft>
+                          <a:spcPts val="800"/>
+                        </a:spcAft>
+                      </a:pPr>
+                      <a:r>
+                        <a:rPr lang="en-US" sz="1600">
+                          <a:effectLst/>
+                        </a:rPr>
+                        <a:t>Wednesday</a:t>
+                      </a:r>
+                      <a:endParaRPr lang="en-US" sz="1600">
+                        <a:effectLst/>
+                        <a:latin typeface="Calibri" panose="020F0502020204030204" pitchFamily="34" charset="0"/>
+                        <a:ea typeface="Calibri" panose="020F0502020204030204" pitchFamily="34" charset="0"/>
+                        <a:cs typeface="Times New Roman" panose="02020603050405020304" pitchFamily="18" charset="0"/>
+                      </a:endParaRPr>
+                    </a:p>
+                  </a:txBody>
+                  <a:tcPr marL="15875" marR="15875" marT="15875" marB="15875" anchor="ctr">
+                    <a:lnL w="12700" cap="flat" cmpd="sng" algn="ctr">
+                      <a:solidFill>
+                        <a:schemeClr val="tx1"/>
+                      </a:solidFill>
+                      <a:prstDash val="solid"/>
+                      <a:round/>
+                      <a:headEnd type="none" w="med" len="med"/>
+                      <a:tailEnd type="none" w="med" len="med"/>
+                    </a:lnL>
+                    <a:lnR w="12700" cap="flat" cmpd="sng" algn="ctr">
+                      <a:solidFill>
+                        <a:schemeClr val="tx1"/>
+                      </a:solidFill>
+                      <a:prstDash val="solid"/>
+                      <a:round/>
+                      <a:headEnd type="none" w="med" len="med"/>
+                      <a:tailEnd type="none" w="med" len="med"/>
+                    </a:lnR>
+                    <a:lnT w="12700" cap="flat" cmpd="sng" algn="ctr">
+                      <a:solidFill>
+                        <a:schemeClr val="tx1"/>
+                      </a:solidFill>
+                      <a:prstDash val="solid"/>
+                      <a:round/>
+                      <a:headEnd type="none" w="med" len="med"/>
+                      <a:tailEnd type="none" w="med" len="med"/>
+                    </a:lnT>
+                    <a:lnB w="12700" cap="flat" cmpd="sng" algn="ctr">
+                      <a:solidFill>
+                        <a:schemeClr val="tx1"/>
+                      </a:solidFill>
+                      <a:prstDash val="solid"/>
+                      <a:round/>
+                      <a:headEnd type="none" w="med" len="med"/>
+                      <a:tailEnd type="none" w="med" len="med"/>
+                    </a:lnB>
+                    <a:lnTlToBr w="12700" cmpd="sng">
+                      <a:noFill/>
+                      <a:prstDash val="solid"/>
+                    </a:lnTlToBr>
+                    <a:lnBlToTr w="12700" cmpd="sng">
+                      <a:noFill/>
+                      <a:prstDash val="solid"/>
+                    </a:lnBlToTr>
+                    <a:solidFill>
+                      <a:schemeClr val="bg1"/>
+                    </a:solidFill>
+                  </a:tcPr>
+                </a:tc>
+                <a:tc>
+                  <a:txBody>
+                    <a:bodyPr/>
+                    <a:lstStyle/>
+                    <a:p>
+                      <a:pPr marL="0" marR="0">
+                        <a:lnSpc>
+                          <a:spcPct val="107000"/>
+                        </a:lnSpc>
+                        <a:spcBef>
+                          <a:spcPts val="0"/>
+                        </a:spcBef>
+                        <a:spcAft>
+                          <a:spcPts val="800"/>
+                        </a:spcAft>
+                      </a:pPr>
+                      <a:r>
+                        <a:rPr lang="en-US" sz="1600">
+                          <a:effectLst/>
+                        </a:rPr>
+                        <a:t>3 PM - 5 PM : CSB 120</a:t>
+                      </a:r>
+                      <a:endParaRPr lang="en-US" sz="1600">
+                        <a:effectLst/>
+                        <a:latin typeface="Calibri" panose="020F0502020204030204" pitchFamily="34" charset="0"/>
+                        <a:ea typeface="Calibri" panose="020F0502020204030204" pitchFamily="34" charset="0"/>
+                        <a:cs typeface="Times New Roman" panose="02020603050405020304" pitchFamily="18" charset="0"/>
+                      </a:endParaRPr>
+                    </a:p>
+                  </a:txBody>
+                  <a:tcPr marL="15875" marR="15875" marT="15875" marB="15875" anchor="ctr">
+                    <a:lnL w="12700" cap="flat" cmpd="sng" algn="ctr">
+                      <a:solidFill>
+                        <a:schemeClr val="tx1"/>
+                      </a:solidFill>
+                      <a:prstDash val="solid"/>
+                      <a:round/>
+                      <a:headEnd type="none" w="med" len="med"/>
+                      <a:tailEnd type="none" w="med" len="med"/>
+                    </a:lnL>
+                    <a:lnR w="12700" cap="flat" cmpd="sng" algn="ctr">
+                      <a:solidFill>
+                        <a:schemeClr val="tx1"/>
+                      </a:solidFill>
+                      <a:prstDash val="solid"/>
+                      <a:round/>
+                      <a:headEnd type="none" w="med" len="med"/>
+                      <a:tailEnd type="none" w="med" len="med"/>
+                    </a:lnR>
+                    <a:lnT w="12700" cap="flat" cmpd="sng" algn="ctr">
+                      <a:solidFill>
+                        <a:schemeClr val="tx1"/>
+                      </a:solidFill>
+                      <a:prstDash val="solid"/>
+                      <a:round/>
+                      <a:headEnd type="none" w="med" len="med"/>
+                      <a:tailEnd type="none" w="med" len="med"/>
+                    </a:lnT>
+                    <a:lnB w="12700" cap="flat" cmpd="sng" algn="ctr">
+                      <a:solidFill>
+                        <a:schemeClr val="tx1"/>
+                      </a:solidFill>
+                      <a:prstDash val="solid"/>
+                      <a:round/>
+                      <a:headEnd type="none" w="med" len="med"/>
+                      <a:tailEnd type="none" w="med" len="med"/>
+                    </a:lnB>
+                    <a:lnTlToBr w="12700" cmpd="sng">
+                      <a:noFill/>
+                      <a:prstDash val="solid"/>
+                    </a:lnTlToBr>
+                    <a:lnBlToTr w="12700" cmpd="sng">
+                      <a:noFill/>
+                      <a:prstDash val="solid"/>
+                    </a:lnBlToTr>
+                    <a:solidFill>
+                      <a:schemeClr val="bg1"/>
+                    </a:solidFill>
+                  </a:tcPr>
+                </a:tc>
+                <a:extLst>
+                  <a:ext uri="{0D108BD9-81ED-4DB2-BD59-A6C34878D82A}">
+                    <a16:rowId xmlns:a16="http://schemas.microsoft.com/office/drawing/2014/main" val="1097778555"/>
+                  </a:ext>
+                </a:extLst>
+              </a:tr>
+              <a:tr h="307347">
+                <a:tc>
+                  <a:txBody>
+                    <a:bodyPr/>
+                    <a:lstStyle/>
+                    <a:p>
+                      <a:pPr marL="0" marR="0">
+                        <a:lnSpc>
+                          <a:spcPct val="107000"/>
+                        </a:lnSpc>
+                        <a:spcBef>
+                          <a:spcPts val="0"/>
+                        </a:spcBef>
+                        <a:spcAft>
+                          <a:spcPts val="800"/>
+                        </a:spcAft>
+                      </a:pPr>
+                      <a:r>
+                        <a:rPr lang="en-US" sz="1600">
+                          <a:effectLst/>
+                        </a:rPr>
+                        <a:t>Thursday</a:t>
+                      </a:r>
+                      <a:endParaRPr lang="en-US" sz="1600">
+                        <a:effectLst/>
+                        <a:latin typeface="Calibri" panose="020F0502020204030204" pitchFamily="34" charset="0"/>
+                        <a:ea typeface="Calibri" panose="020F0502020204030204" pitchFamily="34" charset="0"/>
+                        <a:cs typeface="Times New Roman" panose="02020603050405020304" pitchFamily="18" charset="0"/>
+                      </a:endParaRPr>
+                    </a:p>
+                  </a:txBody>
+                  <a:tcPr marL="15875" marR="15875" marT="15875" marB="15875" anchor="ctr">
+                    <a:lnL w="12700" cap="flat" cmpd="sng" algn="ctr">
+                      <a:solidFill>
+                        <a:schemeClr val="tx1"/>
+                      </a:solidFill>
+                      <a:prstDash val="solid"/>
+                      <a:round/>
+                      <a:headEnd type="none" w="med" len="med"/>
+                      <a:tailEnd type="none" w="med" len="med"/>
+                    </a:lnL>
+                    <a:lnR w="12700" cap="flat" cmpd="sng" algn="ctr">
+                      <a:solidFill>
+                        <a:schemeClr val="tx1"/>
+                      </a:solidFill>
+                      <a:prstDash val="solid"/>
+                      <a:round/>
+                      <a:headEnd type="none" w="med" len="med"/>
+                      <a:tailEnd type="none" w="med" len="med"/>
+                    </a:lnR>
+                    <a:lnT w="12700" cap="flat" cmpd="sng" algn="ctr">
+                      <a:solidFill>
+                        <a:schemeClr val="tx1"/>
+                      </a:solidFill>
+                      <a:prstDash val="solid"/>
+                      <a:round/>
+                      <a:headEnd type="none" w="med" len="med"/>
+                      <a:tailEnd type="none" w="med" len="med"/>
+                    </a:lnT>
+                    <a:lnB w="12700" cap="flat" cmpd="sng" algn="ctr">
+                      <a:solidFill>
+                        <a:schemeClr val="tx1"/>
+                      </a:solidFill>
+                      <a:prstDash val="solid"/>
+                      <a:round/>
+                      <a:headEnd type="none" w="med" len="med"/>
+                      <a:tailEnd type="none" w="med" len="med"/>
+                    </a:lnB>
+                    <a:lnTlToBr w="12700" cmpd="sng">
+                      <a:noFill/>
+                      <a:prstDash val="solid"/>
+                    </a:lnTlToBr>
+                    <a:lnBlToTr w="12700" cmpd="sng">
+                      <a:noFill/>
+                      <a:prstDash val="solid"/>
+                    </a:lnBlToTr>
+                    <a:solidFill>
+                      <a:schemeClr val="bg1"/>
+                    </a:solidFill>
+                  </a:tcPr>
+                </a:tc>
+                <a:tc>
+                  <a:txBody>
+                    <a:bodyPr/>
+                    <a:lstStyle/>
+                    <a:p>
+                      <a:pPr marL="0" marR="0">
+                        <a:lnSpc>
+                          <a:spcPct val="107000"/>
+                        </a:lnSpc>
+                        <a:spcBef>
+                          <a:spcPts val="0"/>
+                        </a:spcBef>
+                        <a:spcAft>
+                          <a:spcPts val="800"/>
+                        </a:spcAft>
+                      </a:pPr>
+                      <a:r>
+                        <a:rPr lang="en-US" sz="1600">
+                          <a:effectLst/>
+                        </a:rPr>
+                        <a:t>6 PM - 8 PM : Teams</a:t>
+                      </a:r>
+                      <a:endParaRPr lang="en-US" sz="1600">
+                        <a:effectLst/>
+                        <a:latin typeface="Calibri" panose="020F0502020204030204" pitchFamily="34" charset="0"/>
+                        <a:ea typeface="Calibri" panose="020F0502020204030204" pitchFamily="34" charset="0"/>
+                        <a:cs typeface="Times New Roman" panose="02020603050405020304" pitchFamily="18" charset="0"/>
+                      </a:endParaRPr>
+                    </a:p>
+                  </a:txBody>
+                  <a:tcPr marL="15875" marR="15875" marT="15875" marB="15875" anchor="ctr">
+                    <a:lnL w="12700" cap="flat" cmpd="sng" algn="ctr">
+                      <a:solidFill>
+                        <a:schemeClr val="tx1"/>
+                      </a:solidFill>
+                      <a:prstDash val="solid"/>
+                      <a:round/>
+                      <a:headEnd type="none" w="med" len="med"/>
+                      <a:tailEnd type="none" w="med" len="med"/>
+                    </a:lnL>
+                    <a:lnR w="12700" cap="flat" cmpd="sng" algn="ctr">
+                      <a:solidFill>
+                        <a:schemeClr val="tx1"/>
+                      </a:solidFill>
+                      <a:prstDash val="solid"/>
+                      <a:round/>
+                      <a:headEnd type="none" w="med" len="med"/>
+                      <a:tailEnd type="none" w="med" len="med"/>
+                    </a:lnR>
+                    <a:lnT w="12700" cap="flat" cmpd="sng" algn="ctr">
+                      <a:solidFill>
+                        <a:schemeClr val="tx1"/>
+                      </a:solidFill>
+                      <a:prstDash val="solid"/>
+                      <a:round/>
+                      <a:headEnd type="none" w="med" len="med"/>
+                      <a:tailEnd type="none" w="med" len="med"/>
+                    </a:lnT>
+                    <a:lnB w="12700" cap="flat" cmpd="sng" algn="ctr">
+                      <a:solidFill>
+                        <a:schemeClr val="tx1"/>
+                      </a:solidFill>
+                      <a:prstDash val="solid"/>
+                      <a:round/>
+                      <a:headEnd type="none" w="med" len="med"/>
+                      <a:tailEnd type="none" w="med" len="med"/>
+                    </a:lnB>
+                    <a:lnTlToBr w="12700" cmpd="sng">
+                      <a:noFill/>
+                      <a:prstDash val="solid"/>
+                    </a:lnTlToBr>
+                    <a:lnBlToTr w="12700" cmpd="sng">
+                      <a:noFill/>
+                      <a:prstDash val="solid"/>
+                    </a:lnBlToTr>
+                    <a:solidFill>
+                      <a:schemeClr val="bg1"/>
+                    </a:solidFill>
+                  </a:tcPr>
+                </a:tc>
+                <a:extLst>
+                  <a:ext uri="{0D108BD9-81ED-4DB2-BD59-A6C34878D82A}">
+                    <a16:rowId xmlns:a16="http://schemas.microsoft.com/office/drawing/2014/main" val="1747960062"/>
+                  </a:ext>
+                </a:extLst>
+              </a:tr>
+              <a:tr h="581669">
+                <a:tc>
+                  <a:txBody>
+                    <a:bodyPr/>
+                    <a:lstStyle/>
+                    <a:p>
+                      <a:pPr marL="0" marR="0">
+                        <a:lnSpc>
+                          <a:spcPct val="107000"/>
+                        </a:lnSpc>
+                        <a:spcBef>
+                          <a:spcPts val="0"/>
+                        </a:spcBef>
+                        <a:spcAft>
+                          <a:spcPts val="800"/>
+                        </a:spcAft>
+                      </a:pPr>
+                      <a:r>
+                        <a:rPr lang="en-US" sz="1600">
+                          <a:effectLst/>
+                        </a:rPr>
+                        <a:t>Friday</a:t>
+                      </a:r>
+                      <a:endParaRPr lang="en-US" sz="1600">
+                        <a:effectLst/>
+                        <a:latin typeface="Calibri" panose="020F0502020204030204" pitchFamily="34" charset="0"/>
+                        <a:ea typeface="Calibri" panose="020F0502020204030204" pitchFamily="34" charset="0"/>
+                        <a:cs typeface="Times New Roman" panose="02020603050405020304" pitchFamily="18" charset="0"/>
+                      </a:endParaRPr>
+                    </a:p>
+                  </a:txBody>
+                  <a:tcPr marL="15875" marR="15875" marT="15875" marB="15875" anchor="ctr">
+                    <a:lnL w="12700" cap="flat" cmpd="sng" algn="ctr">
+                      <a:solidFill>
+                        <a:schemeClr val="tx1"/>
+                      </a:solidFill>
+                      <a:prstDash val="solid"/>
+                      <a:round/>
+                      <a:headEnd type="none" w="med" len="med"/>
+                      <a:tailEnd type="none" w="med" len="med"/>
+                    </a:lnL>
+                    <a:lnR w="12700" cap="flat" cmpd="sng" algn="ctr">
+                      <a:solidFill>
+                        <a:schemeClr val="tx1"/>
+                      </a:solidFill>
+                      <a:prstDash val="solid"/>
+                      <a:round/>
+                      <a:headEnd type="none" w="med" len="med"/>
+                      <a:tailEnd type="none" w="med" len="med"/>
+                    </a:lnR>
+                    <a:lnT w="12700" cap="flat" cmpd="sng" algn="ctr">
+                      <a:solidFill>
+                        <a:schemeClr val="tx1"/>
+                      </a:solidFill>
+                      <a:prstDash val="solid"/>
+                      <a:round/>
+                      <a:headEnd type="none" w="med" len="med"/>
+                      <a:tailEnd type="none" w="med" len="med"/>
+                    </a:lnT>
+                    <a:lnB w="12700" cap="flat" cmpd="sng" algn="ctr">
+                      <a:solidFill>
+                        <a:schemeClr val="tx1"/>
+                      </a:solidFill>
+                      <a:prstDash val="solid"/>
+                      <a:round/>
+                      <a:headEnd type="none" w="med" len="med"/>
+                      <a:tailEnd type="none" w="med" len="med"/>
+                    </a:lnB>
+                    <a:lnTlToBr w="12700" cmpd="sng">
+                      <a:noFill/>
+                      <a:prstDash val="solid"/>
+                    </a:lnTlToBr>
+                    <a:lnBlToTr w="12700" cmpd="sng">
+                      <a:noFill/>
+                      <a:prstDash val="solid"/>
+                    </a:lnBlToTr>
+                    <a:solidFill>
+                      <a:schemeClr val="bg1"/>
+                    </a:solidFill>
+                  </a:tcPr>
+                </a:tc>
+                <a:tc>
+                  <a:txBody>
+                    <a:bodyPr/>
+                    <a:lstStyle/>
+                    <a:p>
+                      <a:pPr marL="0" marR="0">
+                        <a:lnSpc>
+                          <a:spcPct val="107000"/>
+                        </a:lnSpc>
+                        <a:spcBef>
+                          <a:spcPts val="0"/>
+                        </a:spcBef>
+                        <a:spcAft>
+                          <a:spcPts val="800"/>
+                        </a:spcAft>
+                      </a:pPr>
+                      <a:r>
+                        <a:rPr lang="en-US" sz="1600">
+                          <a:effectLst/>
+                        </a:rPr>
+                        <a:t>3 PM - 5 PM : CSB 120</a:t>
+                      </a:r>
+                      <a:endParaRPr lang="en-US" sz="1600">
+                        <a:effectLst/>
+                        <a:latin typeface="Calibri" panose="020F0502020204030204" pitchFamily="34" charset="0"/>
+                        <a:ea typeface="Calibri" panose="020F0502020204030204" pitchFamily="34" charset="0"/>
+                        <a:cs typeface="Times New Roman" panose="02020603050405020304" pitchFamily="18" charset="0"/>
+                      </a:endParaRPr>
+                    </a:p>
+                  </a:txBody>
+                  <a:tcPr marL="15875" marR="15875" marT="15875" marB="15875" anchor="ctr">
+                    <a:lnL w="12700" cap="flat" cmpd="sng" algn="ctr">
+                      <a:solidFill>
+                        <a:schemeClr val="tx1"/>
+                      </a:solidFill>
+                      <a:prstDash val="solid"/>
+                      <a:round/>
+                      <a:headEnd type="none" w="med" len="med"/>
+                      <a:tailEnd type="none" w="med" len="med"/>
+                    </a:lnL>
+                    <a:lnR w="12700" cap="flat" cmpd="sng" algn="ctr">
+                      <a:solidFill>
+                        <a:schemeClr val="tx1"/>
+                      </a:solidFill>
+                      <a:prstDash val="solid"/>
+                      <a:round/>
+                      <a:headEnd type="none" w="med" len="med"/>
+                      <a:tailEnd type="none" w="med" len="med"/>
+                    </a:lnR>
+                    <a:lnT w="12700" cap="flat" cmpd="sng" algn="ctr">
+                      <a:solidFill>
+                        <a:schemeClr val="tx1"/>
+                      </a:solidFill>
+                      <a:prstDash val="solid"/>
+                      <a:round/>
+                      <a:headEnd type="none" w="med" len="med"/>
+                      <a:tailEnd type="none" w="med" len="med"/>
+                    </a:lnT>
+                    <a:lnB w="12700" cap="flat" cmpd="sng" algn="ctr">
+                      <a:solidFill>
+                        <a:schemeClr val="tx1"/>
+                      </a:solidFill>
+                      <a:prstDash val="solid"/>
+                      <a:round/>
+                      <a:headEnd type="none" w="med" len="med"/>
+                      <a:tailEnd type="none" w="med" len="med"/>
+                    </a:lnB>
+                    <a:lnTlToBr w="12700" cmpd="sng">
+                      <a:noFill/>
+                      <a:prstDash val="solid"/>
+                    </a:lnTlToBr>
+                    <a:lnBlToTr w="12700" cmpd="sng">
+                      <a:noFill/>
+                      <a:prstDash val="solid"/>
+                    </a:lnBlToTr>
+                    <a:solidFill>
+                      <a:schemeClr val="bg1"/>
+                    </a:solidFill>
+                  </a:tcPr>
+                </a:tc>
+                <a:extLst>
+                  <a:ext uri="{0D108BD9-81ED-4DB2-BD59-A6C34878D82A}">
+                    <a16:rowId xmlns:a16="http://schemas.microsoft.com/office/drawing/2014/main" val="1553865624"/>
+                  </a:ext>
+                </a:extLst>
+              </a:tr>
+              <a:tr h="307347">
+                <a:tc>
+                  <a:txBody>
+                    <a:bodyPr/>
+                    <a:lstStyle/>
+                    <a:p>
+                      <a:pPr marL="0" marR="0">
+                        <a:lnSpc>
+                          <a:spcPct val="107000"/>
+                        </a:lnSpc>
+                        <a:spcBef>
+                          <a:spcPts val="0"/>
+                        </a:spcBef>
+                        <a:spcAft>
+                          <a:spcPts val="800"/>
+                        </a:spcAft>
+                      </a:pPr>
+                      <a:r>
+                        <a:rPr lang="en-US" sz="1600">
+                          <a:effectLst/>
+                        </a:rPr>
+                        <a:t>Saturday</a:t>
+                      </a:r>
+                      <a:endParaRPr lang="en-US" sz="1600">
+                        <a:effectLst/>
+                        <a:latin typeface="Calibri" panose="020F0502020204030204" pitchFamily="34" charset="0"/>
+                        <a:ea typeface="Calibri" panose="020F0502020204030204" pitchFamily="34" charset="0"/>
+                        <a:cs typeface="Times New Roman" panose="02020603050405020304" pitchFamily="18" charset="0"/>
+                      </a:endParaRPr>
+                    </a:p>
+                  </a:txBody>
+                  <a:tcPr marL="15875" marR="15875" marT="15875" marB="15875" anchor="ctr">
+                    <a:lnL w="12700" cap="flat" cmpd="sng" algn="ctr">
+                      <a:solidFill>
+                        <a:schemeClr val="tx1"/>
+                      </a:solidFill>
+                      <a:prstDash val="solid"/>
+                      <a:round/>
+                      <a:headEnd type="none" w="med" len="med"/>
+                      <a:tailEnd type="none" w="med" len="med"/>
+                    </a:lnL>
+                    <a:lnR w="12700" cap="flat" cmpd="sng" algn="ctr">
+                      <a:solidFill>
+                        <a:schemeClr val="tx1"/>
+                      </a:solidFill>
+                      <a:prstDash val="solid"/>
+                      <a:round/>
+                      <a:headEnd type="none" w="med" len="med"/>
+                      <a:tailEnd type="none" w="med" len="med"/>
+                    </a:lnR>
+                    <a:lnT w="12700" cap="flat" cmpd="sng" algn="ctr">
+                      <a:solidFill>
+                        <a:schemeClr val="tx1"/>
+                      </a:solidFill>
+                      <a:prstDash val="solid"/>
+                      <a:round/>
+                      <a:headEnd type="none" w="med" len="med"/>
+                      <a:tailEnd type="none" w="med" len="med"/>
+                    </a:lnT>
+                    <a:lnB w="12700" cap="flat" cmpd="sng" algn="ctr">
+                      <a:solidFill>
+                        <a:schemeClr val="tx1"/>
+                      </a:solidFill>
+                      <a:prstDash val="solid"/>
+                      <a:round/>
+                      <a:headEnd type="none" w="med" len="med"/>
+                      <a:tailEnd type="none" w="med" len="med"/>
+                    </a:lnB>
+                    <a:lnTlToBr w="12700" cmpd="sng">
+                      <a:noFill/>
+                      <a:prstDash val="solid"/>
+                    </a:lnTlToBr>
+                    <a:lnBlToTr w="12700" cmpd="sng">
+                      <a:noFill/>
+                      <a:prstDash val="solid"/>
+                    </a:lnBlToTr>
+                    <a:solidFill>
+                      <a:schemeClr val="bg1"/>
+                    </a:solidFill>
+                  </a:tcPr>
+                </a:tc>
+                <a:tc>
+                  <a:txBody>
+                    <a:bodyPr/>
+                    <a:lstStyle/>
+                    <a:p>
+                      <a:pPr marL="0" marR="0">
+                        <a:lnSpc>
+                          <a:spcPct val="107000"/>
+                        </a:lnSpc>
+                        <a:spcBef>
+                          <a:spcPts val="0"/>
+                        </a:spcBef>
+                        <a:spcAft>
+                          <a:spcPts val="800"/>
+                        </a:spcAft>
+                      </a:pPr>
+                      <a:r>
+                        <a:rPr lang="en-US" sz="1600" dirty="0">
+                          <a:effectLst/>
+                        </a:rPr>
+                        <a:t>12 PM - 4 PM : Teams</a:t>
+                      </a:r>
+                      <a:endParaRPr lang="en-US" sz="1600" dirty="0">
+                        <a:effectLst/>
+                        <a:latin typeface="Calibri" panose="020F0502020204030204" pitchFamily="34" charset="0"/>
+                        <a:ea typeface="Calibri" panose="020F0502020204030204" pitchFamily="34" charset="0"/>
+                        <a:cs typeface="Times New Roman" panose="02020603050405020304" pitchFamily="18" charset="0"/>
+                      </a:endParaRPr>
+                    </a:p>
+                  </a:txBody>
+                  <a:tcPr marL="15875" marR="15875" marT="15875" marB="15875" anchor="ctr">
+                    <a:lnL w="12700" cap="flat" cmpd="sng" algn="ctr">
+                      <a:solidFill>
+                        <a:schemeClr val="tx1"/>
+                      </a:solidFill>
+                      <a:prstDash val="solid"/>
+                      <a:round/>
+                      <a:headEnd type="none" w="med" len="med"/>
+                      <a:tailEnd type="none" w="med" len="med"/>
+                    </a:lnL>
+                    <a:lnR w="12700" cap="flat" cmpd="sng" algn="ctr">
+                      <a:solidFill>
+                        <a:schemeClr val="tx1"/>
+                      </a:solidFill>
+                      <a:prstDash val="solid"/>
+                      <a:round/>
+                      <a:headEnd type="none" w="med" len="med"/>
+                      <a:tailEnd type="none" w="med" len="med"/>
+                    </a:lnR>
+                    <a:lnT w="12700" cap="flat" cmpd="sng" algn="ctr">
+                      <a:solidFill>
+                        <a:schemeClr val="tx1"/>
+                      </a:solidFill>
+                      <a:prstDash val="solid"/>
+                      <a:round/>
+                      <a:headEnd type="none" w="med" len="med"/>
+                      <a:tailEnd type="none" w="med" len="med"/>
+                    </a:lnT>
+                    <a:lnB w="12700" cap="flat" cmpd="sng" algn="ctr">
+                      <a:solidFill>
+                        <a:schemeClr val="tx1"/>
+                      </a:solidFill>
+                      <a:prstDash val="solid"/>
+                      <a:round/>
+                      <a:headEnd type="none" w="med" len="med"/>
+                      <a:tailEnd type="none" w="med" len="med"/>
+                    </a:lnB>
+                    <a:lnTlToBr w="12700" cmpd="sng">
+                      <a:noFill/>
+                      <a:prstDash val="solid"/>
+                    </a:lnTlToBr>
+                    <a:lnBlToTr w="12700" cmpd="sng">
+                      <a:noFill/>
+                      <a:prstDash val="solid"/>
+                    </a:lnBlToTr>
+                    <a:solidFill>
+                      <a:schemeClr val="bg1"/>
+                    </a:solidFill>
+                  </a:tcPr>
+                </a:tc>
+                <a:extLst>
+                  <a:ext uri="{0D108BD9-81ED-4DB2-BD59-A6C34878D82A}">
+                    <a16:rowId xmlns:a16="http://schemas.microsoft.com/office/drawing/2014/main" val="3921746368"/>
+                  </a:ext>
+                </a:extLst>
+              </a:tr>
+              <a:tr h="307347">
+                <a:tc>
+                  <a:txBody>
+                    <a:bodyPr/>
+                    <a:lstStyle/>
+                    <a:p>
+                      <a:pPr marL="0" marR="0">
+                        <a:lnSpc>
+                          <a:spcPct val="107000"/>
+                        </a:lnSpc>
+                        <a:spcBef>
+                          <a:spcPts val="0"/>
+                        </a:spcBef>
+                        <a:spcAft>
+                          <a:spcPts val="800"/>
+                        </a:spcAft>
+                      </a:pPr>
+                      <a:r>
+                        <a:rPr lang="en-US" sz="1600">
+                          <a:effectLst/>
+                        </a:rPr>
+                        <a:t>Sunday</a:t>
+                      </a:r>
+                      <a:endParaRPr lang="en-US" sz="1600">
+                        <a:effectLst/>
+                        <a:latin typeface="Calibri" panose="020F0502020204030204" pitchFamily="34" charset="0"/>
+                        <a:ea typeface="Calibri" panose="020F0502020204030204" pitchFamily="34" charset="0"/>
+                        <a:cs typeface="Times New Roman" panose="02020603050405020304" pitchFamily="18" charset="0"/>
+                      </a:endParaRPr>
+                    </a:p>
+                  </a:txBody>
+                  <a:tcPr marL="15875" marR="15875" marT="15875" marB="15875" anchor="ctr">
+                    <a:lnL w="12700" cap="flat" cmpd="sng" algn="ctr">
+                      <a:solidFill>
+                        <a:schemeClr val="tx1"/>
+                      </a:solidFill>
+                      <a:prstDash val="solid"/>
+                      <a:round/>
+                      <a:headEnd type="none" w="med" len="med"/>
+                      <a:tailEnd type="none" w="med" len="med"/>
+                    </a:lnL>
+                    <a:lnR w="12700" cap="flat" cmpd="sng" algn="ctr">
+                      <a:solidFill>
+                        <a:schemeClr val="tx1"/>
+                      </a:solidFill>
+                      <a:prstDash val="solid"/>
+                      <a:round/>
+                      <a:headEnd type="none" w="med" len="med"/>
+                      <a:tailEnd type="none" w="med" len="med"/>
+                    </a:lnR>
+                    <a:lnT w="12700" cap="flat" cmpd="sng" algn="ctr">
+                      <a:solidFill>
+                        <a:schemeClr val="tx1"/>
+                      </a:solidFill>
+                      <a:prstDash val="solid"/>
+                      <a:round/>
+                      <a:headEnd type="none" w="med" len="med"/>
+                      <a:tailEnd type="none" w="med" len="med"/>
+                    </a:lnT>
+                    <a:lnB w="12700" cap="flat" cmpd="sng" algn="ctr">
+                      <a:solidFill>
+                        <a:schemeClr val="tx1"/>
+                      </a:solidFill>
+                      <a:prstDash val="solid"/>
+                      <a:round/>
+                      <a:headEnd type="none" w="med" len="med"/>
+                      <a:tailEnd type="none" w="med" len="med"/>
+                    </a:lnB>
+                    <a:lnTlToBr w="12700" cmpd="sng">
+                      <a:noFill/>
+                      <a:prstDash val="solid"/>
+                    </a:lnTlToBr>
+                    <a:lnBlToTr w="12700" cmpd="sng">
+                      <a:noFill/>
+                      <a:prstDash val="solid"/>
+                    </a:lnBlToTr>
+                    <a:solidFill>
+                      <a:schemeClr val="bg1"/>
+                    </a:solidFill>
+                  </a:tcPr>
+                </a:tc>
+                <a:tc>
+                  <a:txBody>
+                    <a:bodyPr/>
+                    <a:lstStyle/>
+                    <a:p>
+                      <a:pPr marL="0" marR="0">
+                        <a:lnSpc>
+                          <a:spcPct val="107000"/>
+                        </a:lnSpc>
+                        <a:spcBef>
+                          <a:spcPts val="0"/>
+                        </a:spcBef>
+                        <a:spcAft>
+                          <a:spcPts val="800"/>
+                        </a:spcAft>
+                      </a:pPr>
+                      <a:r>
+                        <a:rPr lang="en-US" sz="1600" dirty="0">
+                          <a:effectLst/>
+                        </a:rPr>
+                        <a:t>12 PM - 4 PM : Teams</a:t>
+                      </a:r>
+                      <a:endParaRPr lang="en-US" sz="1600" dirty="0">
+                        <a:effectLst/>
+                        <a:latin typeface="Calibri" panose="020F0502020204030204" pitchFamily="34" charset="0"/>
+                        <a:ea typeface="Calibri" panose="020F0502020204030204" pitchFamily="34" charset="0"/>
+                        <a:cs typeface="Times New Roman" panose="02020603050405020304" pitchFamily="18" charset="0"/>
+                      </a:endParaRPr>
+                    </a:p>
+                  </a:txBody>
+                  <a:tcPr marL="15875" marR="15875" marT="15875" marB="15875" anchor="ctr">
+                    <a:lnL w="12700" cap="flat" cmpd="sng" algn="ctr">
+                      <a:solidFill>
+                        <a:schemeClr val="tx1"/>
+                      </a:solidFill>
+                      <a:prstDash val="solid"/>
+                      <a:round/>
+                      <a:headEnd type="none" w="med" len="med"/>
+                      <a:tailEnd type="none" w="med" len="med"/>
+                    </a:lnL>
+                    <a:lnR w="12700" cap="flat" cmpd="sng" algn="ctr">
+                      <a:solidFill>
+                        <a:schemeClr val="tx1"/>
+                      </a:solidFill>
+                      <a:prstDash val="solid"/>
+                      <a:round/>
+                      <a:headEnd type="none" w="med" len="med"/>
+                      <a:tailEnd type="none" w="med" len="med"/>
+                    </a:lnR>
+                    <a:lnT w="12700" cap="flat" cmpd="sng" algn="ctr">
+                      <a:solidFill>
+                        <a:schemeClr val="tx1"/>
+                      </a:solidFill>
+                      <a:prstDash val="solid"/>
+                      <a:round/>
+                      <a:headEnd type="none" w="med" len="med"/>
+                      <a:tailEnd type="none" w="med" len="med"/>
+                    </a:lnT>
+                    <a:lnB w="12700" cap="flat" cmpd="sng" algn="ctr">
+                      <a:solidFill>
+                        <a:schemeClr val="tx1"/>
+                      </a:solidFill>
+                      <a:prstDash val="solid"/>
+                      <a:round/>
+                      <a:headEnd type="none" w="med" len="med"/>
+                      <a:tailEnd type="none" w="med" len="med"/>
+                    </a:lnB>
+                    <a:lnTlToBr w="12700" cmpd="sng">
+                      <a:noFill/>
+                      <a:prstDash val="solid"/>
+                    </a:lnTlToBr>
+                    <a:lnBlToTr w="12700" cmpd="sng">
+                      <a:noFill/>
+                      <a:prstDash val="solid"/>
+                    </a:lnBlToTr>
+                    <a:solidFill>
+                      <a:schemeClr val="bg1"/>
+                    </a:solidFill>
+                  </a:tcPr>
+                </a:tc>
+                <a:extLst>
+                  <a:ext uri="{0D108BD9-81ED-4DB2-BD59-A6C34878D82A}">
+                    <a16:rowId xmlns:a16="http://schemas.microsoft.com/office/drawing/2014/main" val="1928039740"/>
+                  </a:ext>
+                </a:extLst>
+              </a:tr>
+            </a:tbl>
+          </a:graphicData>
+        </a:graphic>
+      </p:graphicFrame>
     </p:spTree>
     <p:extLst>
       <p:ext uri="{BB962C8B-B14F-4D97-AF65-F5344CB8AC3E}">
@@ -15425,7 +15842,7 @@
             </a:solidFill>
             <a:extLst>
               <a:ext uri="{C807C97D-BFC1-408E-A445-0C87EB9F89A2}">
-                <ask:lineSketchStyleProps xmlns="" xmlns:ask="http://schemas.microsoft.com/office/drawing/2018/sketchyshapes" sd="1219033472">
+                <ask:lineSketchStyleProps xmlns:ask="http://schemas.microsoft.com/office/drawing/2018/sketchyshapes" xmlns="" sd="1219033472">
                   <a:prstGeom prst="donut">
                     <a:avLst>
                       <a:gd name="adj" fmla="val 11469"/>
@@ -18078,6 +18495,14 @@
 </file>
 
 <file path=customXml/item1.xml><?xml version="1.0" encoding="utf-8"?>
+<p:properties xmlns:p="http://schemas.microsoft.com/office/2006/metadata/properties" xmlns:xsi="http://www.w3.org/2001/XMLSchema-instance" xmlns:pc="http://schemas.microsoft.com/office/infopath/2007/PartnerControls">
+  <documentManagement>
+    <_activity xmlns="92c41bee-f0ee-4aa6-9399-a35fbb883510" xsi:nil="true"/>
+  </documentManagement>
+</p:properties>
+</file>
+
+<file path=customXml/item2.xml><?xml version="1.0" encoding="utf-8"?>
 <ct:contentTypeSchema xmlns:ct="http://schemas.microsoft.com/office/2006/metadata/contentType" xmlns:ma="http://schemas.microsoft.com/office/2006/metadata/properties/metaAttributes" ct:_="" ma:_="" ma:contentTypeName="Document" ma:contentTypeID="0x010100074387D78AC76C4289401EF66FB51FCC" ma:contentTypeVersion="15" ma:contentTypeDescription="Create a new document." ma:contentTypeScope="" ma:versionID="d3659bec8b8330148a03d82a9d99f412">
   <xsd:schema xmlns:xsd="http://www.w3.org/2001/XMLSchema" xmlns:xs="http://www.w3.org/2001/XMLSchema" xmlns:p="http://schemas.microsoft.com/office/2006/metadata/properties" xmlns:ns3="92c41bee-f0ee-4aa6-9399-a35fbb883510" xmlns:ns4="e06ed288-fd75-4b50-bbed-f5a5df88c31c" targetNamespace="http://schemas.microsoft.com/office/2006/metadata/properties" ma:root="true" ma:fieldsID="1a21d371127b63848c9a2290f5945250" ns3:_="" ns4:_="">
     <xsd:import namespace="92c41bee-f0ee-4aa6-9399-a35fbb883510"/>
@@ -18312,14 +18737,6 @@
 </ct:contentTypeSchema>
 </file>
 
-<file path=customXml/item2.xml><?xml version="1.0" encoding="utf-8"?>
-<p:properties xmlns:p="http://schemas.microsoft.com/office/2006/metadata/properties" xmlns:xsi="http://www.w3.org/2001/XMLSchema-instance" xmlns:pc="http://schemas.microsoft.com/office/infopath/2007/PartnerControls">
-  <documentManagement>
-    <_activity xmlns="92c41bee-f0ee-4aa6-9399-a35fbb883510" xsi:nil="true"/>
-  </documentManagement>
-</p:properties>
-</file>
-
 <file path=customXml/item3.xml><?xml version="1.0" encoding="utf-8"?>
 <?mso-contentType ?>
 <FormTemplates xmlns="http://schemas.microsoft.com/sharepoint/v3/contenttype/forms">
@@ -18330,6 +18747,23 @@
 </file>
 
 <file path=customXml/itemProps1.xml><?xml version="1.0" encoding="utf-8"?>
+<ds:datastoreItem xmlns:ds="http://schemas.openxmlformats.org/officeDocument/2006/customXml" ds:itemID="{7B314A4C-F36E-4B77-8088-995E02CA19E2}">
+  <ds:schemaRefs>
+    <ds:schemaRef ds:uri="http://purl.org/dc/elements/1.1/"/>
+    <ds:schemaRef ds:uri="92c41bee-f0ee-4aa6-9399-a35fbb883510"/>
+    <ds:schemaRef ds:uri="http://purl.org/dc/dcmitype/"/>
+    <ds:schemaRef ds:uri="http://schemas.microsoft.com/office/2006/documentManagement/types"/>
+    <ds:schemaRef ds:uri="http://www.w3.org/XML/1998/namespace"/>
+    <ds:schemaRef ds:uri="http://purl.org/dc/terms/"/>
+    <ds:schemaRef ds:uri="http://schemas.microsoft.com/office/2006/metadata/properties"/>
+    <ds:schemaRef ds:uri="http://schemas.openxmlformats.org/package/2006/metadata/core-properties"/>
+    <ds:schemaRef ds:uri="http://schemas.microsoft.com/office/infopath/2007/PartnerControls"/>
+    <ds:schemaRef ds:uri="e06ed288-fd75-4b50-bbed-f5a5df88c31c"/>
+  </ds:schemaRefs>
+</ds:datastoreItem>
+</file>
+
+<file path=customXml/itemProps2.xml><?xml version="1.0" encoding="utf-8"?>
 <ds:datastoreItem xmlns:ds="http://schemas.openxmlformats.org/officeDocument/2006/customXml" ds:itemID="{4EF4F24D-2E28-4D94-B66A-D8DD020786C4}">
   <ds:schemaRefs>
     <ds:schemaRef ds:uri="http://schemas.microsoft.com/office/2006/metadata/contentType"/>
@@ -18348,23 +18782,6 @@
 </ds:datastoreItem>
 </file>
 
-<file path=customXml/itemProps2.xml><?xml version="1.0" encoding="utf-8"?>
-<ds:datastoreItem xmlns:ds="http://schemas.openxmlformats.org/officeDocument/2006/customXml" ds:itemID="{7B314A4C-F36E-4B77-8088-995E02CA19E2}">
-  <ds:schemaRefs>
-    <ds:schemaRef ds:uri="http://schemas.microsoft.com/office/2006/documentManagement/types"/>
-    <ds:schemaRef ds:uri="http://purl.org/dc/terms/"/>
-    <ds:schemaRef ds:uri="http://schemas.openxmlformats.org/package/2006/metadata/core-properties"/>
-    <ds:schemaRef ds:uri="http://www.w3.org/XML/1998/namespace"/>
-    <ds:schemaRef ds:uri="http://purl.org/dc/elements/1.1/"/>
-    <ds:schemaRef ds:uri="http://purl.org/dc/dcmitype/"/>
-    <ds:schemaRef ds:uri="e06ed288-fd75-4b50-bbed-f5a5df88c31c"/>
-    <ds:schemaRef ds:uri="http://schemas.microsoft.com/office/infopath/2007/PartnerControls"/>
-    <ds:schemaRef ds:uri="92c41bee-f0ee-4aa6-9399-a35fbb883510"/>
-    <ds:schemaRef ds:uri="http://schemas.microsoft.com/office/2006/metadata/properties"/>
-  </ds:schemaRefs>
-</ds:datastoreItem>
-</file>
-
 <file path=customXml/itemProps3.xml><?xml version="1.0" encoding="utf-8"?>
 <ds:datastoreItem xmlns:ds="http://schemas.openxmlformats.org/officeDocument/2006/customXml" ds:itemID="{25AE7EBA-1544-49DE-A7CE-260722EE4A5C}">
   <ds:schemaRefs>

</xml_diff>